<commit_message>
präsentation und doku und benutzerhandbuch
</commit_message>
<xml_diff>
--- a/Planung/Präsentation/Präsentation.pptx
+++ b/Planung/Präsentation/Präsentation.pptx
@@ -10,8 +10,14 @@
     <p:sldId id="261" r:id="rId4"/>
     <p:sldId id="259" r:id="rId5"/>
     <p:sldId id="260" r:id="rId6"/>
-    <p:sldId id="262" r:id="rId7"/>
-    <p:sldId id="258" r:id="rId8"/>
+    <p:sldId id="269" r:id="rId7"/>
+    <p:sldId id="266" r:id="rId8"/>
+    <p:sldId id="267" r:id="rId9"/>
+    <p:sldId id="262" r:id="rId10"/>
+    <p:sldId id="265" r:id="rId11"/>
+    <p:sldId id="268" r:id="rId12"/>
+    <p:sldId id="258" r:id="rId13"/>
+    <p:sldId id="264" r:id="rId14"/>
   </p:sldIdLst>
   <p:sldSz cx="12192000" cy="6858000"/>
   <p:notesSz cx="6858000" cy="9144000"/>
@@ -880,7 +886,7 @@
       </dgm:t>
     </dgm:pt>
     <dgm:pt modelId="{71D37F6D-D337-4CD8-8138-840D7F6D1C00}">
-      <dgm:prSet phldrT="[Text]" phldr="1"/>
+      <dgm:prSet phldrT="[Text]"/>
       <dgm:spPr>
         <a:blipFill rotWithShape="0">
           <a:blip xmlns:r="http://schemas.openxmlformats.org/officeDocument/2006/relationships" r:embed="rId1"/>
@@ -893,6 +899,10 @@
         <a:bodyPr/>
         <a:lstStyle/>
         <a:p>
+          <a:r>
+            <a:rPr lang="de-DE" dirty="0" smtClean="0"/>
+            <a:t> </a:t>
+          </a:r>
           <a:endParaRPr lang="de-DE" dirty="0"/>
         </a:p>
       </dgm:t>
@@ -920,7 +930,7 @@
       </dgm:t>
     </dgm:pt>
     <dgm:pt modelId="{BCA84BF3-8138-43EF-9011-88C8AF5EAE61}">
-      <dgm:prSet phldrT="[Text]" phldr="1"/>
+      <dgm:prSet phldrT="[Text]"/>
       <dgm:spPr>
         <a:blipFill rotWithShape="0">
           <a:blip xmlns:r="http://schemas.openxmlformats.org/officeDocument/2006/relationships" r:embed="rId2"/>
@@ -933,6 +943,10 @@
         <a:bodyPr/>
         <a:lstStyle/>
         <a:p>
+          <a:r>
+            <a:rPr lang="de-DE" dirty="0" smtClean="0"/>
+            <a:t> </a:t>
+          </a:r>
           <a:endParaRPr lang="de-DE" dirty="0"/>
         </a:p>
       </dgm:t>
@@ -960,7 +974,7 @@
       </dgm:t>
     </dgm:pt>
     <dgm:pt modelId="{2979AA3D-00F6-43A8-9AB2-3054F1813E1A}">
-      <dgm:prSet phldrT="[Text]" phldr="1"/>
+      <dgm:prSet phldrT="[Text]"/>
       <dgm:spPr>
         <a:blipFill rotWithShape="0">
           <a:blip xmlns:r="http://schemas.openxmlformats.org/officeDocument/2006/relationships" r:embed="rId3"/>
@@ -973,6 +987,10 @@
         <a:bodyPr/>
         <a:lstStyle/>
         <a:p>
+          <a:r>
+            <a:rPr lang="de-DE" dirty="0" smtClean="0"/>
+            <a:t> </a:t>
+          </a:r>
           <a:endParaRPr lang="de-DE" dirty="0"/>
         </a:p>
       </dgm:t>
@@ -1000,7 +1018,7 @@
       </dgm:t>
     </dgm:pt>
     <dgm:pt modelId="{ECC1CF02-F4E1-45F9-85AE-D503B1B0999D}">
-      <dgm:prSet phldrT="[Text]" phldr="1"/>
+      <dgm:prSet phldrT="[Text]"/>
       <dgm:spPr>
         <a:blipFill rotWithShape="0">
           <a:blip xmlns:r="http://schemas.openxmlformats.org/officeDocument/2006/relationships" r:embed="rId4"/>
@@ -1013,6 +1031,10 @@
         <a:bodyPr/>
         <a:lstStyle/>
         <a:p>
+          <a:r>
+            <a:rPr lang="de-DE" dirty="0" smtClean="0"/>
+            <a:t> </a:t>
+          </a:r>
           <a:endParaRPr lang="de-DE" dirty="0"/>
         </a:p>
       </dgm:t>
@@ -1051,6 +1073,13 @@
         </dgm:presLayoutVars>
       </dgm:prSet>
       <dgm:spPr/>
+      <dgm:t>
+        <a:bodyPr/>
+        <a:lstStyle/>
+        <a:p>
+          <a:endParaRPr lang="de-DE"/>
+        </a:p>
+      </dgm:t>
     </dgm:pt>
     <dgm:pt modelId="{DC33B8B6-5DCE-40F1-804A-489549865AC3}" type="pres">
       <dgm:prSet presAssocID="{71D37F6D-D337-4CD8-8138-840D7F6D1C00}" presName="hierRoot1" presStyleCnt="0">
@@ -1071,10 +1100,24 @@
         </dgm:presLayoutVars>
       </dgm:prSet>
       <dgm:spPr/>
+      <dgm:t>
+        <a:bodyPr/>
+        <a:lstStyle/>
+        <a:p>
+          <a:endParaRPr lang="de-DE"/>
+        </a:p>
+      </dgm:t>
     </dgm:pt>
     <dgm:pt modelId="{053588D2-690D-425C-A056-57887E60A212}" type="pres">
       <dgm:prSet presAssocID="{71D37F6D-D337-4CD8-8138-840D7F6D1C00}" presName="rootConnector1" presStyleLbl="node1" presStyleIdx="0" presStyleCnt="0"/>
       <dgm:spPr/>
+      <dgm:t>
+        <a:bodyPr/>
+        <a:lstStyle/>
+        <a:p>
+          <a:endParaRPr lang="de-DE"/>
+        </a:p>
+      </dgm:t>
     </dgm:pt>
     <dgm:pt modelId="{CFD39470-776F-44E7-A9E6-3857DB1060D1}" type="pres">
       <dgm:prSet presAssocID="{71D37F6D-D337-4CD8-8138-840D7F6D1C00}" presName="hierChild2" presStyleCnt="0"/>
@@ -1083,6 +1126,13 @@
     <dgm:pt modelId="{076533CF-160B-4604-887E-8FD294F447EB}" type="pres">
       <dgm:prSet presAssocID="{A983FADB-2A14-466A-801D-7C90E556FCA0}" presName="Name37" presStyleLbl="parChTrans1D2" presStyleIdx="0" presStyleCnt="3"/>
       <dgm:spPr/>
+      <dgm:t>
+        <a:bodyPr/>
+        <a:lstStyle/>
+        <a:p>
+          <a:endParaRPr lang="de-DE"/>
+        </a:p>
+      </dgm:t>
     </dgm:pt>
     <dgm:pt modelId="{E30EDAFE-FD2D-4B29-92B5-25551188FA5B}" type="pres">
       <dgm:prSet presAssocID="{BCA84BF3-8138-43EF-9011-88C8AF5EAE61}" presName="hierRoot2" presStyleCnt="0">
@@ -1103,10 +1153,24 @@
         </dgm:presLayoutVars>
       </dgm:prSet>
       <dgm:spPr/>
+      <dgm:t>
+        <a:bodyPr/>
+        <a:lstStyle/>
+        <a:p>
+          <a:endParaRPr lang="de-DE"/>
+        </a:p>
+      </dgm:t>
     </dgm:pt>
     <dgm:pt modelId="{489DC457-615F-47F1-ABDD-7399B9D547C6}" type="pres">
       <dgm:prSet presAssocID="{BCA84BF3-8138-43EF-9011-88C8AF5EAE61}" presName="rootConnector" presStyleLbl="node2" presStyleIdx="0" presStyleCnt="3"/>
       <dgm:spPr/>
+      <dgm:t>
+        <a:bodyPr/>
+        <a:lstStyle/>
+        <a:p>
+          <a:endParaRPr lang="de-DE"/>
+        </a:p>
+      </dgm:t>
     </dgm:pt>
     <dgm:pt modelId="{A278A9E6-BB98-41CC-8216-84DE0BE35A39}" type="pres">
       <dgm:prSet presAssocID="{BCA84BF3-8138-43EF-9011-88C8AF5EAE61}" presName="hierChild4" presStyleCnt="0"/>
@@ -1119,6 +1183,13 @@
     <dgm:pt modelId="{3A975C12-5E3B-4A0C-B258-0A144104FBE7}" type="pres">
       <dgm:prSet presAssocID="{320848E3-1823-4B0C-90F6-C66DDFCCA93D}" presName="Name37" presStyleLbl="parChTrans1D2" presStyleIdx="1" presStyleCnt="3"/>
       <dgm:spPr/>
+      <dgm:t>
+        <a:bodyPr/>
+        <a:lstStyle/>
+        <a:p>
+          <a:endParaRPr lang="de-DE"/>
+        </a:p>
+      </dgm:t>
     </dgm:pt>
     <dgm:pt modelId="{1335249A-C179-42C6-B4B4-578EAD96F75E}" type="pres">
       <dgm:prSet presAssocID="{2979AA3D-00F6-43A8-9AB2-3054F1813E1A}" presName="hierRoot2" presStyleCnt="0">
@@ -1139,10 +1210,24 @@
         </dgm:presLayoutVars>
       </dgm:prSet>
       <dgm:spPr/>
+      <dgm:t>
+        <a:bodyPr/>
+        <a:lstStyle/>
+        <a:p>
+          <a:endParaRPr lang="de-DE"/>
+        </a:p>
+      </dgm:t>
     </dgm:pt>
     <dgm:pt modelId="{470139E1-487F-4761-A46E-C70F9517D4A3}" type="pres">
       <dgm:prSet presAssocID="{2979AA3D-00F6-43A8-9AB2-3054F1813E1A}" presName="rootConnector" presStyleLbl="node2" presStyleIdx="1" presStyleCnt="3"/>
       <dgm:spPr/>
+      <dgm:t>
+        <a:bodyPr/>
+        <a:lstStyle/>
+        <a:p>
+          <a:endParaRPr lang="de-DE"/>
+        </a:p>
+      </dgm:t>
     </dgm:pt>
     <dgm:pt modelId="{34570E81-A485-4F5E-957F-99E938A13D94}" type="pres">
       <dgm:prSet presAssocID="{2979AA3D-00F6-43A8-9AB2-3054F1813E1A}" presName="hierChild4" presStyleCnt="0"/>
@@ -1155,6 +1240,13 @@
     <dgm:pt modelId="{35CB2E3D-7B06-4425-BA5C-7D4583F0E23E}" type="pres">
       <dgm:prSet presAssocID="{6711727D-0628-4819-AA9B-ACBCBC136AEE}" presName="Name37" presStyleLbl="parChTrans1D2" presStyleIdx="2" presStyleCnt="3"/>
       <dgm:spPr/>
+      <dgm:t>
+        <a:bodyPr/>
+        <a:lstStyle/>
+        <a:p>
+          <a:endParaRPr lang="de-DE"/>
+        </a:p>
+      </dgm:t>
     </dgm:pt>
     <dgm:pt modelId="{F3E2FD8E-375F-47CF-A37A-6E4893993369}" type="pres">
       <dgm:prSet presAssocID="{ECC1CF02-F4E1-45F9-85AE-D503B1B0999D}" presName="hierRoot2" presStyleCnt="0">
@@ -1175,10 +1267,24 @@
         </dgm:presLayoutVars>
       </dgm:prSet>
       <dgm:spPr/>
+      <dgm:t>
+        <a:bodyPr/>
+        <a:lstStyle/>
+        <a:p>
+          <a:endParaRPr lang="de-DE"/>
+        </a:p>
+      </dgm:t>
     </dgm:pt>
     <dgm:pt modelId="{4B2C2DB4-B40B-45C0-BDAC-E88F16BA0008}" type="pres">
       <dgm:prSet presAssocID="{ECC1CF02-F4E1-45F9-85AE-D503B1B0999D}" presName="rootConnector" presStyleLbl="node2" presStyleIdx="2" presStyleCnt="3"/>
       <dgm:spPr/>
+      <dgm:t>
+        <a:bodyPr/>
+        <a:lstStyle/>
+        <a:p>
+          <a:endParaRPr lang="de-DE"/>
+        </a:p>
+      </dgm:t>
     </dgm:pt>
     <dgm:pt modelId="{B22D4894-2C3C-4991-AC37-7BF0D47A648F}" type="pres">
       <dgm:prSet presAssocID="{ECC1CF02-F4E1-45F9-85AE-D503B1B0999D}" presName="hierChild4" presStyleCnt="0"/>
@@ -1194,22 +1300,22 @@
     </dgm:pt>
   </dgm:ptLst>
   <dgm:cxnLst>
-    <dgm:cxn modelId="{EC926E63-3396-4102-B3E1-14772B592D91}" type="presOf" srcId="{320848E3-1823-4B0C-90F6-C66DDFCCA93D}" destId="{3A975C12-5E3B-4A0C-B258-0A144104FBE7}" srcOrd="0" destOrd="0" presId="urn:microsoft.com/office/officeart/2005/8/layout/orgChart1"/>
-    <dgm:cxn modelId="{9AF5AE0C-0DDF-4C06-835B-396C3B9A9333}" type="presOf" srcId="{BCA84BF3-8138-43EF-9011-88C8AF5EAE61}" destId="{489DC457-615F-47F1-ABDD-7399B9D547C6}" srcOrd="1" destOrd="0" presId="urn:microsoft.com/office/officeart/2005/8/layout/orgChart1"/>
-    <dgm:cxn modelId="{2F555544-18CB-4EAE-B171-33DFDB75A15C}" srcId="{71D37F6D-D337-4CD8-8138-840D7F6D1C00}" destId="{2979AA3D-00F6-43A8-9AB2-3054F1813E1A}" srcOrd="1" destOrd="0" parTransId="{320848E3-1823-4B0C-90F6-C66DDFCCA93D}" sibTransId="{5F638BC3-6B9A-4D63-851F-3272CFC3CD7A}"/>
-    <dgm:cxn modelId="{168D7CFA-7D19-4987-8CCD-50F881375E12}" type="presOf" srcId="{6711727D-0628-4819-AA9B-ACBCBC136AEE}" destId="{35CB2E3D-7B06-4425-BA5C-7D4583F0E23E}" srcOrd="0" destOrd="0" presId="urn:microsoft.com/office/officeart/2005/8/layout/orgChart1"/>
     <dgm:cxn modelId="{405AF7F4-DF9F-485F-9935-C3078058A7B7}" type="presOf" srcId="{ECC1CF02-F4E1-45F9-85AE-D503B1B0999D}" destId="{4B2C2DB4-B40B-45C0-BDAC-E88F16BA0008}" srcOrd="1" destOrd="0" presId="urn:microsoft.com/office/officeart/2005/8/layout/orgChart1"/>
-    <dgm:cxn modelId="{C86D6527-ABED-4CC7-88EE-18C514B87605}" srcId="{03DBD633-2D25-455C-A5FF-E18706D5D325}" destId="{71D37F6D-D337-4CD8-8138-840D7F6D1C00}" srcOrd="0" destOrd="0" parTransId="{FF621236-55B7-4759-83F1-272288F6BF5D}" sibTransId="{31D9C570-D892-4B83-A1E1-4044AA0669EF}"/>
     <dgm:cxn modelId="{BBAFA9BC-7423-4920-BD47-03AF9760F2B9}" type="presOf" srcId="{71D37F6D-D337-4CD8-8138-840D7F6D1C00}" destId="{053588D2-690D-425C-A056-57887E60A212}" srcOrd="1" destOrd="0" presId="urn:microsoft.com/office/officeart/2005/8/layout/orgChart1"/>
-    <dgm:cxn modelId="{64E35EBD-5FF6-4924-9690-01AA0FB5CE8B}" srcId="{71D37F6D-D337-4CD8-8138-840D7F6D1C00}" destId="{BCA84BF3-8138-43EF-9011-88C8AF5EAE61}" srcOrd="0" destOrd="0" parTransId="{A983FADB-2A14-466A-801D-7C90E556FCA0}" sibTransId="{61F69AE5-F9A3-437D-8224-7E70DC2BCEEB}"/>
     <dgm:cxn modelId="{56845920-4AFF-40E2-9054-A25348C7DB52}" type="presOf" srcId="{BCA84BF3-8138-43EF-9011-88C8AF5EAE61}" destId="{13EBC188-928E-4623-9AF8-FC8CC76C1485}" srcOrd="0" destOrd="0" presId="urn:microsoft.com/office/officeart/2005/8/layout/orgChart1"/>
     <dgm:cxn modelId="{5861FCC8-1A37-44DD-A3D8-770004ABA5A8}" type="presOf" srcId="{71D37F6D-D337-4CD8-8138-840D7F6D1C00}" destId="{F0F35536-17AF-45FC-9575-4E14CA0280AB}" srcOrd="0" destOrd="0" presId="urn:microsoft.com/office/officeart/2005/8/layout/orgChart1"/>
+    <dgm:cxn modelId="{2F555544-18CB-4EAE-B171-33DFDB75A15C}" srcId="{71D37F6D-D337-4CD8-8138-840D7F6D1C00}" destId="{2979AA3D-00F6-43A8-9AB2-3054F1813E1A}" srcOrd="1" destOrd="0" parTransId="{320848E3-1823-4B0C-90F6-C66DDFCCA93D}" sibTransId="{5F638BC3-6B9A-4D63-851F-3272CFC3CD7A}"/>
+    <dgm:cxn modelId="{102CA0FF-CD06-47B8-987B-A98E6E05551A}" type="presOf" srcId="{A983FADB-2A14-466A-801D-7C90E556FCA0}" destId="{076533CF-160B-4604-887E-8FD294F447EB}" srcOrd="0" destOrd="0" presId="urn:microsoft.com/office/officeart/2005/8/layout/orgChart1"/>
     <dgm:cxn modelId="{2ADDA84F-186D-49A5-A810-0808BEE3AFEA}" type="presOf" srcId="{2979AA3D-00F6-43A8-9AB2-3054F1813E1A}" destId="{803A093A-D15C-40F3-A8D1-4ED0CC29B08A}" srcOrd="0" destOrd="0" presId="urn:microsoft.com/office/officeart/2005/8/layout/orgChart1"/>
+    <dgm:cxn modelId="{168D7CFA-7D19-4987-8CCD-50F881375E12}" type="presOf" srcId="{6711727D-0628-4819-AA9B-ACBCBC136AEE}" destId="{35CB2E3D-7B06-4425-BA5C-7D4583F0E23E}" srcOrd="0" destOrd="0" presId="urn:microsoft.com/office/officeart/2005/8/layout/orgChart1"/>
+    <dgm:cxn modelId="{C86D6527-ABED-4CC7-88EE-18C514B87605}" srcId="{03DBD633-2D25-455C-A5FF-E18706D5D325}" destId="{71D37F6D-D337-4CD8-8138-840D7F6D1C00}" srcOrd="0" destOrd="0" parTransId="{FF621236-55B7-4759-83F1-272288F6BF5D}" sibTransId="{31D9C570-D892-4B83-A1E1-4044AA0669EF}"/>
+    <dgm:cxn modelId="{878B3C0F-3E92-4AD2-AE50-1CB3AC75A6A0}" type="presOf" srcId="{03DBD633-2D25-455C-A5FF-E18706D5D325}" destId="{397A06DE-062B-4B6E-8F3C-A1F9ED5FD92D}" srcOrd="0" destOrd="0" presId="urn:microsoft.com/office/officeart/2005/8/layout/orgChart1"/>
+    <dgm:cxn modelId="{9AF5AE0C-0DDF-4C06-835B-396C3B9A9333}" type="presOf" srcId="{BCA84BF3-8138-43EF-9011-88C8AF5EAE61}" destId="{489DC457-615F-47F1-ABDD-7399B9D547C6}" srcOrd="1" destOrd="0" presId="urn:microsoft.com/office/officeart/2005/8/layout/orgChart1"/>
+    <dgm:cxn modelId="{71D670FB-93D8-46CC-910B-F88C3DF3103B}" type="presOf" srcId="{ECC1CF02-F4E1-45F9-85AE-D503B1B0999D}" destId="{A8935B47-CFBE-4025-93A8-AFDCA761A9C4}" srcOrd="0" destOrd="0" presId="urn:microsoft.com/office/officeart/2005/8/layout/orgChart1"/>
     <dgm:cxn modelId="{7F666EDF-2007-4F66-A7BA-A641203E077A}" srcId="{71D37F6D-D337-4CD8-8138-840D7F6D1C00}" destId="{ECC1CF02-F4E1-45F9-85AE-D503B1B0999D}" srcOrd="2" destOrd="0" parTransId="{6711727D-0628-4819-AA9B-ACBCBC136AEE}" sibTransId="{8C5132D0-01EF-49E2-8C6B-32246F63A6E5}"/>
-    <dgm:cxn modelId="{878B3C0F-3E92-4AD2-AE50-1CB3AC75A6A0}" type="presOf" srcId="{03DBD633-2D25-455C-A5FF-E18706D5D325}" destId="{397A06DE-062B-4B6E-8F3C-A1F9ED5FD92D}" srcOrd="0" destOrd="0" presId="urn:microsoft.com/office/officeart/2005/8/layout/orgChart1"/>
+    <dgm:cxn modelId="{64E35EBD-5FF6-4924-9690-01AA0FB5CE8B}" srcId="{71D37F6D-D337-4CD8-8138-840D7F6D1C00}" destId="{BCA84BF3-8138-43EF-9011-88C8AF5EAE61}" srcOrd="0" destOrd="0" parTransId="{A983FADB-2A14-466A-801D-7C90E556FCA0}" sibTransId="{61F69AE5-F9A3-437D-8224-7E70DC2BCEEB}"/>
     <dgm:cxn modelId="{531A73AA-7649-4A3C-8715-F80B523FECC6}" type="presOf" srcId="{2979AA3D-00F6-43A8-9AB2-3054F1813E1A}" destId="{470139E1-487F-4761-A46E-C70F9517D4A3}" srcOrd="1" destOrd="0" presId="urn:microsoft.com/office/officeart/2005/8/layout/orgChart1"/>
-    <dgm:cxn modelId="{102CA0FF-CD06-47B8-987B-A98E6E05551A}" type="presOf" srcId="{A983FADB-2A14-466A-801D-7C90E556FCA0}" destId="{076533CF-160B-4604-887E-8FD294F447EB}" srcOrd="0" destOrd="0" presId="urn:microsoft.com/office/officeart/2005/8/layout/orgChart1"/>
-    <dgm:cxn modelId="{71D670FB-93D8-46CC-910B-F88C3DF3103B}" type="presOf" srcId="{ECC1CF02-F4E1-45F9-85AE-D503B1B0999D}" destId="{A8935B47-CFBE-4025-93A8-AFDCA761A9C4}" srcOrd="0" destOrd="0" presId="urn:microsoft.com/office/officeart/2005/8/layout/orgChart1"/>
+    <dgm:cxn modelId="{EC926E63-3396-4102-B3E1-14772B592D91}" type="presOf" srcId="{320848E3-1823-4B0C-90F6-C66DDFCCA93D}" destId="{3A975C12-5E3B-4A0C-B258-0A144104FBE7}" srcOrd="0" destOrd="0" presId="urn:microsoft.com/office/officeart/2005/8/layout/orgChart1"/>
     <dgm:cxn modelId="{C89F0B7F-0C06-4215-A07A-CF8B26501DD7}" type="presParOf" srcId="{397A06DE-062B-4B6E-8F3C-A1F9ED5FD92D}" destId="{DC33B8B6-5DCE-40F1-804A-489549865AC3}" srcOrd="0" destOrd="0" presId="urn:microsoft.com/office/officeart/2005/8/layout/orgChart1"/>
     <dgm:cxn modelId="{3D4B2BBB-4A89-4A53-BB2A-08DDFD8C35BE}" type="presParOf" srcId="{DC33B8B6-5DCE-40F1-804A-489549865AC3}" destId="{2C864CC3-61D2-4443-8551-19E7CDDE4FEC}" srcOrd="0" destOrd="0" presId="urn:microsoft.com/office/officeart/2005/8/layout/orgChart1"/>
     <dgm:cxn modelId="{6AC1A196-9925-4B95-B019-B6C702D53E48}" type="presParOf" srcId="{2C864CC3-61D2-4443-8551-19E7CDDE4FEC}" destId="{F0F35536-17AF-45FC-9575-4E14CA0280AB}" srcOrd="0" destOrd="0" presId="urn:microsoft.com/office/officeart/2005/8/layout/orgChart1"/>
@@ -1256,467 +1362,6 @@
       <dsp:cNvGrpSpPr/>
     </dsp:nvGrpSpPr>
     <dsp:grpSpPr/>
-    <dsp:sp modelId="{35CB2E3D-7B06-4425-BA5C-7D4583F0E23E}">
-      <dsp:nvSpPr>
-        <dsp:cNvPr id="0" name=""/>
-        <dsp:cNvSpPr/>
-      </dsp:nvSpPr>
-      <dsp:spPr>
-        <a:xfrm>
-          <a:off x="4380706" y="1504305"/>
-          <a:ext cx="1408957" cy="244529"/>
-        </a:xfrm>
-        <a:custGeom>
-          <a:avLst/>
-          <a:gdLst/>
-          <a:ahLst/>
-          <a:cxnLst/>
-          <a:rect l="0" t="0" r="0" b="0"/>
-          <a:pathLst>
-            <a:path>
-              <a:moveTo>
-                <a:pt x="0" y="0"/>
-              </a:moveTo>
-              <a:lnTo>
-                <a:pt x="0" y="122264"/>
-              </a:lnTo>
-              <a:lnTo>
-                <a:pt x="1408957" y="122264"/>
-              </a:lnTo>
-              <a:lnTo>
-                <a:pt x="1408957" y="244529"/>
-              </a:lnTo>
-            </a:path>
-          </a:pathLst>
-        </a:custGeom>
-        <a:noFill/>
-        <a:ln w="19050" cap="rnd" cmpd="sng" algn="ctr">
-          <a:solidFill>
-            <a:schemeClr val="accent1">
-              <a:shade val="60000"/>
-              <a:hueOff val="0"/>
-              <a:satOff val="0"/>
-              <a:lumOff val="0"/>
-              <a:alphaOff val="0"/>
-            </a:schemeClr>
-          </a:solidFill>
-          <a:prstDash val="solid"/>
-        </a:ln>
-        <a:effectLst/>
-      </dsp:spPr>
-      <dsp:style>
-        <a:lnRef idx="2">
-          <a:scrgbClr r="0" g="0" b="0"/>
-        </a:lnRef>
-        <a:fillRef idx="0">
-          <a:scrgbClr r="0" g="0" b="0"/>
-        </a:fillRef>
-        <a:effectRef idx="0">
-          <a:scrgbClr r="0" g="0" b="0"/>
-        </a:effectRef>
-        <a:fontRef idx="minor"/>
-      </dsp:style>
-    </dsp:sp>
-    <dsp:sp modelId="{3A975C12-5E3B-4A0C-B258-0A144104FBE7}">
-      <dsp:nvSpPr>
-        <dsp:cNvPr id="0" name=""/>
-        <dsp:cNvSpPr/>
-      </dsp:nvSpPr>
-      <dsp:spPr>
-        <a:xfrm>
-          <a:off x="4334986" y="1504305"/>
-          <a:ext cx="91440" cy="244529"/>
-        </a:xfrm>
-        <a:custGeom>
-          <a:avLst/>
-          <a:gdLst/>
-          <a:ahLst/>
-          <a:cxnLst/>
-          <a:rect l="0" t="0" r="0" b="0"/>
-          <a:pathLst>
-            <a:path>
-              <a:moveTo>
-                <a:pt x="45720" y="0"/>
-              </a:moveTo>
-              <a:lnTo>
-                <a:pt x="45720" y="244529"/>
-              </a:lnTo>
-            </a:path>
-          </a:pathLst>
-        </a:custGeom>
-        <a:noFill/>
-        <a:ln w="19050" cap="rnd" cmpd="sng" algn="ctr">
-          <a:solidFill>
-            <a:schemeClr val="accent1">
-              <a:shade val="60000"/>
-              <a:hueOff val="0"/>
-              <a:satOff val="0"/>
-              <a:lumOff val="0"/>
-              <a:alphaOff val="0"/>
-            </a:schemeClr>
-          </a:solidFill>
-          <a:prstDash val="solid"/>
-        </a:ln>
-        <a:effectLst/>
-      </dsp:spPr>
-      <dsp:style>
-        <a:lnRef idx="2">
-          <a:scrgbClr r="0" g="0" b="0"/>
-        </a:lnRef>
-        <a:fillRef idx="0">
-          <a:scrgbClr r="0" g="0" b="0"/>
-        </a:fillRef>
-        <a:effectRef idx="0">
-          <a:scrgbClr r="0" g="0" b="0"/>
-        </a:effectRef>
-        <a:fontRef idx="minor"/>
-      </dsp:style>
-    </dsp:sp>
-    <dsp:sp modelId="{076533CF-160B-4604-887E-8FD294F447EB}">
-      <dsp:nvSpPr>
-        <dsp:cNvPr id="0" name=""/>
-        <dsp:cNvSpPr/>
-      </dsp:nvSpPr>
-      <dsp:spPr>
-        <a:xfrm>
-          <a:off x="2971749" y="1504305"/>
-          <a:ext cx="1408957" cy="244529"/>
-        </a:xfrm>
-        <a:custGeom>
-          <a:avLst/>
-          <a:gdLst/>
-          <a:ahLst/>
-          <a:cxnLst/>
-          <a:rect l="0" t="0" r="0" b="0"/>
-          <a:pathLst>
-            <a:path>
-              <a:moveTo>
-                <a:pt x="1408957" y="0"/>
-              </a:moveTo>
-              <a:lnTo>
-                <a:pt x="1408957" y="122264"/>
-              </a:lnTo>
-              <a:lnTo>
-                <a:pt x="0" y="122264"/>
-              </a:lnTo>
-              <a:lnTo>
-                <a:pt x="0" y="244529"/>
-              </a:lnTo>
-            </a:path>
-          </a:pathLst>
-        </a:custGeom>
-        <a:noFill/>
-        <a:ln w="19050" cap="rnd" cmpd="sng" algn="ctr">
-          <a:solidFill>
-            <a:schemeClr val="accent1">
-              <a:shade val="60000"/>
-              <a:hueOff val="0"/>
-              <a:satOff val="0"/>
-              <a:lumOff val="0"/>
-              <a:alphaOff val="0"/>
-            </a:schemeClr>
-          </a:solidFill>
-          <a:prstDash val="solid"/>
-        </a:ln>
-        <a:effectLst/>
-      </dsp:spPr>
-      <dsp:style>
-        <a:lnRef idx="2">
-          <a:scrgbClr r="0" g="0" b="0"/>
-        </a:lnRef>
-        <a:fillRef idx="0">
-          <a:scrgbClr r="0" g="0" b="0"/>
-        </a:fillRef>
-        <a:effectRef idx="0">
-          <a:scrgbClr r="0" g="0" b="0"/>
-        </a:effectRef>
-        <a:fontRef idx="minor"/>
-      </dsp:style>
-    </dsp:sp>
-    <dsp:sp modelId="{F0F35536-17AF-45FC-9575-4E14CA0280AB}">
-      <dsp:nvSpPr>
-        <dsp:cNvPr id="0" name=""/>
-        <dsp:cNvSpPr/>
-      </dsp:nvSpPr>
-      <dsp:spPr>
-        <a:xfrm>
-          <a:off x="3798492" y="662"/>
-          <a:ext cx="1164427" cy="1503642"/>
-        </a:xfrm>
-        <a:prstGeom prst="rect">
-          <a:avLst/>
-        </a:prstGeom>
-        <a:blipFill rotWithShape="0">
-          <a:blip xmlns:r="http://schemas.openxmlformats.org/officeDocument/2006/relationships" r:embed="rId1"/>
-          <a:stretch>
-            <a:fillRect/>
-          </a:stretch>
-        </a:blipFill>
-        <a:ln w="19050" cap="rnd" cmpd="sng" algn="ctr">
-          <a:solidFill>
-            <a:schemeClr val="lt1">
-              <a:hueOff val="0"/>
-              <a:satOff val="0"/>
-              <a:lumOff val="0"/>
-              <a:alphaOff val="0"/>
-            </a:schemeClr>
-          </a:solidFill>
-          <a:prstDash val="solid"/>
-        </a:ln>
-        <a:effectLst/>
-      </dsp:spPr>
-      <dsp:style>
-        <a:lnRef idx="2">
-          <a:scrgbClr r="0" g="0" b="0"/>
-        </a:lnRef>
-        <a:fillRef idx="1">
-          <a:scrgbClr r="0" g="0" b="0"/>
-        </a:fillRef>
-        <a:effectRef idx="0">
-          <a:scrgbClr r="0" g="0" b="0"/>
-        </a:effectRef>
-        <a:fontRef idx="minor">
-          <a:schemeClr val="lt1"/>
-        </a:fontRef>
-      </dsp:style>
-      <dsp:txBody>
-        <a:bodyPr spcFirstLastPara="0" vert="horz" wrap="square" lIns="21590" tIns="21590" rIns="21590" bIns="21590" numCol="1" spcCol="1270" anchor="ctr" anchorCtr="0">
-          <a:noAutofit/>
-        </a:bodyPr>
-        <a:lstStyle/>
-        <a:p>
-          <a:pPr lvl="0" algn="ctr" defTabSz="1511300">
-            <a:lnSpc>
-              <a:spcPct val="90000"/>
-            </a:lnSpc>
-            <a:spcBef>
-              <a:spcPct val="0"/>
-            </a:spcBef>
-            <a:spcAft>
-              <a:spcPct val="35000"/>
-            </a:spcAft>
-          </a:pPr>
-          <a:endParaRPr lang="de-DE" sz="3400" kern="1200" dirty="0"/>
-        </a:p>
-      </dsp:txBody>
-      <dsp:txXfrm>
-        <a:off x="3798492" y="662"/>
-        <a:ext cx="1164427" cy="1503642"/>
-      </dsp:txXfrm>
-    </dsp:sp>
-    <dsp:sp modelId="{13EBC188-928E-4623-9AF8-FC8CC76C1485}">
-      <dsp:nvSpPr>
-        <dsp:cNvPr id="0" name=""/>
-        <dsp:cNvSpPr/>
-      </dsp:nvSpPr>
-      <dsp:spPr>
-        <a:xfrm>
-          <a:off x="2389535" y="1748835"/>
-          <a:ext cx="1164427" cy="1664822"/>
-        </a:xfrm>
-        <a:prstGeom prst="rect">
-          <a:avLst/>
-        </a:prstGeom>
-        <a:blipFill rotWithShape="0">
-          <a:blip xmlns:r="http://schemas.openxmlformats.org/officeDocument/2006/relationships" r:embed="rId2"/>
-          <a:stretch>
-            <a:fillRect/>
-          </a:stretch>
-        </a:blipFill>
-        <a:ln w="19050" cap="rnd" cmpd="sng" algn="ctr">
-          <a:solidFill>
-            <a:schemeClr val="lt1">
-              <a:hueOff val="0"/>
-              <a:satOff val="0"/>
-              <a:lumOff val="0"/>
-              <a:alphaOff val="0"/>
-            </a:schemeClr>
-          </a:solidFill>
-          <a:prstDash val="solid"/>
-        </a:ln>
-        <a:effectLst/>
-      </dsp:spPr>
-      <dsp:style>
-        <a:lnRef idx="2">
-          <a:scrgbClr r="0" g="0" b="0"/>
-        </a:lnRef>
-        <a:fillRef idx="1">
-          <a:scrgbClr r="0" g="0" b="0"/>
-        </a:fillRef>
-        <a:effectRef idx="0">
-          <a:scrgbClr r="0" g="0" b="0"/>
-        </a:effectRef>
-        <a:fontRef idx="minor">
-          <a:schemeClr val="lt1"/>
-        </a:fontRef>
-      </dsp:style>
-      <dsp:txBody>
-        <a:bodyPr spcFirstLastPara="0" vert="horz" wrap="square" lIns="21590" tIns="21590" rIns="21590" bIns="21590" numCol="1" spcCol="1270" anchor="ctr" anchorCtr="0">
-          <a:noAutofit/>
-        </a:bodyPr>
-        <a:lstStyle/>
-        <a:p>
-          <a:pPr lvl="0" algn="ctr" defTabSz="1511300">
-            <a:lnSpc>
-              <a:spcPct val="90000"/>
-            </a:lnSpc>
-            <a:spcBef>
-              <a:spcPct val="0"/>
-            </a:spcBef>
-            <a:spcAft>
-              <a:spcPct val="35000"/>
-            </a:spcAft>
-          </a:pPr>
-          <a:endParaRPr lang="de-DE" sz="3400" kern="1200" dirty="0"/>
-        </a:p>
-      </dsp:txBody>
-      <dsp:txXfrm>
-        <a:off x="2389535" y="1748835"/>
-        <a:ext cx="1164427" cy="1664822"/>
-      </dsp:txXfrm>
-    </dsp:sp>
-    <dsp:sp modelId="{803A093A-D15C-40F3-A8D1-4ED0CC29B08A}">
-      <dsp:nvSpPr>
-        <dsp:cNvPr id="0" name=""/>
-        <dsp:cNvSpPr/>
-      </dsp:nvSpPr>
-      <dsp:spPr>
-        <a:xfrm>
-          <a:off x="3798492" y="1748835"/>
-          <a:ext cx="1164427" cy="1665666"/>
-        </a:xfrm>
-        <a:prstGeom prst="rect">
-          <a:avLst/>
-        </a:prstGeom>
-        <a:blipFill rotWithShape="0">
-          <a:blip xmlns:r="http://schemas.openxmlformats.org/officeDocument/2006/relationships" r:embed="rId3"/>
-          <a:stretch>
-            <a:fillRect/>
-          </a:stretch>
-        </a:blipFill>
-        <a:ln w="19050" cap="rnd" cmpd="sng" algn="ctr">
-          <a:solidFill>
-            <a:schemeClr val="lt1">
-              <a:hueOff val="0"/>
-              <a:satOff val="0"/>
-              <a:lumOff val="0"/>
-              <a:alphaOff val="0"/>
-            </a:schemeClr>
-          </a:solidFill>
-          <a:prstDash val="solid"/>
-        </a:ln>
-        <a:effectLst/>
-      </dsp:spPr>
-      <dsp:style>
-        <a:lnRef idx="2">
-          <a:scrgbClr r="0" g="0" b="0"/>
-        </a:lnRef>
-        <a:fillRef idx="1">
-          <a:scrgbClr r="0" g="0" b="0"/>
-        </a:fillRef>
-        <a:effectRef idx="0">
-          <a:scrgbClr r="0" g="0" b="0"/>
-        </a:effectRef>
-        <a:fontRef idx="minor">
-          <a:schemeClr val="lt1"/>
-        </a:fontRef>
-      </dsp:style>
-      <dsp:txBody>
-        <a:bodyPr spcFirstLastPara="0" vert="horz" wrap="square" lIns="21590" tIns="21590" rIns="21590" bIns="21590" numCol="1" spcCol="1270" anchor="ctr" anchorCtr="0">
-          <a:noAutofit/>
-        </a:bodyPr>
-        <a:lstStyle/>
-        <a:p>
-          <a:pPr lvl="0" algn="ctr" defTabSz="1511300">
-            <a:lnSpc>
-              <a:spcPct val="90000"/>
-            </a:lnSpc>
-            <a:spcBef>
-              <a:spcPct val="0"/>
-            </a:spcBef>
-            <a:spcAft>
-              <a:spcPct val="35000"/>
-            </a:spcAft>
-          </a:pPr>
-          <a:endParaRPr lang="de-DE" sz="3400" kern="1200" dirty="0"/>
-        </a:p>
-      </dsp:txBody>
-      <dsp:txXfrm>
-        <a:off x="3798492" y="1748835"/>
-        <a:ext cx="1164427" cy="1665666"/>
-      </dsp:txXfrm>
-    </dsp:sp>
-    <dsp:sp modelId="{A8935B47-CFBE-4025-93A8-AFDCA761A9C4}">
-      <dsp:nvSpPr>
-        <dsp:cNvPr id="0" name=""/>
-        <dsp:cNvSpPr/>
-      </dsp:nvSpPr>
-      <dsp:spPr>
-        <a:xfrm>
-          <a:off x="5207449" y="1748835"/>
-          <a:ext cx="1164427" cy="1666801"/>
-        </a:xfrm>
-        <a:prstGeom prst="rect">
-          <a:avLst/>
-        </a:prstGeom>
-        <a:blipFill rotWithShape="0">
-          <a:blip xmlns:r="http://schemas.openxmlformats.org/officeDocument/2006/relationships" r:embed="rId4"/>
-          <a:stretch>
-            <a:fillRect/>
-          </a:stretch>
-        </a:blipFill>
-        <a:ln w="19050" cap="rnd" cmpd="sng" algn="ctr">
-          <a:solidFill>
-            <a:schemeClr val="lt1">
-              <a:hueOff val="0"/>
-              <a:satOff val="0"/>
-              <a:lumOff val="0"/>
-              <a:alphaOff val="0"/>
-            </a:schemeClr>
-          </a:solidFill>
-          <a:prstDash val="solid"/>
-        </a:ln>
-        <a:effectLst/>
-      </dsp:spPr>
-      <dsp:style>
-        <a:lnRef idx="2">
-          <a:scrgbClr r="0" g="0" b="0"/>
-        </a:lnRef>
-        <a:fillRef idx="1">
-          <a:scrgbClr r="0" g="0" b="0"/>
-        </a:fillRef>
-        <a:effectRef idx="0">
-          <a:scrgbClr r="0" g="0" b="0"/>
-        </a:effectRef>
-        <a:fontRef idx="minor">
-          <a:schemeClr val="lt1"/>
-        </a:fontRef>
-      </dsp:style>
-      <dsp:txBody>
-        <a:bodyPr spcFirstLastPara="0" vert="horz" wrap="square" lIns="21590" tIns="21590" rIns="21590" bIns="21590" numCol="1" spcCol="1270" anchor="ctr" anchorCtr="0">
-          <a:noAutofit/>
-        </a:bodyPr>
-        <a:lstStyle/>
-        <a:p>
-          <a:pPr lvl="0" algn="ctr" defTabSz="1511300">
-            <a:lnSpc>
-              <a:spcPct val="90000"/>
-            </a:lnSpc>
-            <a:spcBef>
-              <a:spcPct val="0"/>
-            </a:spcBef>
-            <a:spcAft>
-              <a:spcPct val="35000"/>
-            </a:spcAft>
-          </a:pPr>
-          <a:endParaRPr lang="de-DE" sz="3400" kern="1200" dirty="0"/>
-        </a:p>
-      </dsp:txBody>
-      <dsp:txXfrm>
-        <a:off x="5207449" y="1748835"/>
-        <a:ext cx="1164427" cy="1666801"/>
-      </dsp:txXfrm>
-    </dsp:sp>
   </dsp:spTree>
 </dsp:drawing>
 </file>
@@ -18069,7 +17714,7 @@
 </p:sld>
 </file>
 
-<file path=ppt/slides/slide2.xml><?xml version="1.0" encoding="utf-8"?>
+<file path=ppt/slides/slide10.xml><?xml version="1.0" encoding="utf-8"?>
 <p:sld xmlns:a="http://schemas.openxmlformats.org/drawingml/2006/main" xmlns:r="http://schemas.openxmlformats.org/officeDocument/2006/relationships" xmlns:p="http://schemas.openxmlformats.org/presentationml/2006/main">
   <p:cSld>
     <p:spTree>
@@ -18103,7 +17748,7 @@
           <a:p>
             <a:r>
               <a:rPr lang="de-DE" dirty="0" smtClean="0"/>
-              <a:t>Gliederung</a:t>
+              <a:t>Realisierung</a:t>
             </a:r>
             <a:endParaRPr lang="de-DE" dirty="0"/>
           </a:p>
@@ -18116,7 +17761,7 @@
             <a:spLocks noGrp="1"/>
           </p:cNvSpPr>
           <p:nvPr>
-            <p:ph idx="1"/>
+            <p:ph sz="half" idx="1"/>
           </p:nvPr>
         </p:nvSpPr>
         <p:spPr/>
@@ -18126,46 +17771,81 @@
           <a:p>
             <a:r>
               <a:rPr lang="de-DE" dirty="0" smtClean="0"/>
-              <a:t>Projektteam</a:t>
+              <a:t>Darstellung der Datenpunkte in Google </a:t>
             </a:r>
+            <a:r>
+              <a:rPr lang="de-DE" dirty="0" err="1" smtClean="0"/>
+              <a:t>Map</a:t>
+            </a:r>
+            <a:endParaRPr lang="de-DE" dirty="0" smtClean="0"/>
           </a:p>
           <a:p>
             <a:r>
               <a:rPr lang="de-DE" dirty="0" smtClean="0"/>
-              <a:t>Aufgabenstellung</a:t>
+              <a:t>Darstellung der Informationen einfach abrufbar</a:t>
             </a:r>
-            <a:endParaRPr lang="de-DE" dirty="0" smtClean="0"/>
           </a:p>
           <a:p>
             <a:r>
               <a:rPr lang="de-DE" dirty="0" smtClean="0"/>
-              <a:t>Ausgangss</a:t>
+              <a:t>Navigation zum ausgewählten Datenpunkt verfügbar</a:t>
             </a:r>
-            <a:r>
-              <a:rPr lang="de-DE" dirty="0" smtClean="0"/>
-              <a:t>ituation</a:t>
-            </a:r>
-            <a:endParaRPr lang="de-DE" dirty="0" smtClean="0"/>
-          </a:p>
-          <a:p>
-            <a:r>
-              <a:rPr lang="de-DE" smtClean="0"/>
-              <a:t>Realisierung</a:t>
-            </a:r>
-            <a:endParaRPr lang="de-DE" dirty="0" smtClean="0"/>
-          </a:p>
-          <a:p>
-            <a:r>
-              <a:rPr lang="de-DE" dirty="0" smtClean="0"/>
-              <a:t>Danksagung</a:t>
-            </a:r>
+          </a:p>
+          <a:p>
+            <a:endParaRPr lang="de-DE" dirty="0"/>
           </a:p>
         </p:txBody>
       </p:sp>
+      <p:pic>
+        <p:nvPicPr>
+          <p:cNvPr id="5" name="Grafik 17" descr="C:\Users\Alexander\AppData\Local\Microsoft\Windows\INetCache\Content.Word\Screenshot_2015-05-04-08-34-31.png"/>
+          <p:cNvPicPr>
+            <a:picLocks noGrp="1" noChangeAspect="1"/>
+          </p:cNvPicPr>
+          <p:nvPr>
+            <p:ph sz="half" idx="2"/>
+          </p:nvPr>
+        </p:nvPicPr>
+        <p:blipFill rotWithShape="1">
+          <a:blip r:embed="rId2" cstate="print">
+            <a:extLst>
+              <a:ext uri="{28A0092B-C50C-407E-A947-70E740481C1C}">
+                <a14:useLocalDpi xmlns:a14="http://schemas.microsoft.com/office/drawing/2010/main" val="0"/>
+              </a:ext>
+            </a:extLst>
+          </a:blip>
+          <a:srcRect t="3958"/>
+          <a:stretch/>
+        </p:blipFill>
+        <p:spPr bwMode="auto">
+          <a:xfrm>
+            <a:off x="7597070" y="2331650"/>
+            <a:ext cx="2319297" cy="3960000"/>
+          </a:xfrm>
+          <a:prstGeom prst="rect">
+            <a:avLst/>
+          </a:prstGeom>
+          <a:ln>
+            <a:noFill/>
+          </a:ln>
+          <a:effectLst>
+            <a:outerShdw blurRad="190500" algn="tl" rotWithShape="0">
+              <a:srgbClr val="000000">
+                <a:alpha val="70000"/>
+              </a:srgbClr>
+            </a:outerShdw>
+          </a:effectLst>
+          <a:extLst>
+            <a:ext uri="{53640926-AAD7-44D8-BBD7-CCE9431645EC}">
+              <a14:shadowObscured xmlns:a14="http://schemas.microsoft.com/office/drawing/2010/main"/>
+            </a:ext>
+          </a:extLst>
+        </p:spPr>
+      </p:pic>
     </p:spTree>
     <p:extLst>
       <p:ext uri="{BB962C8B-B14F-4D97-AF65-F5344CB8AC3E}">
-        <p14:creationId xmlns:p14="http://schemas.microsoft.com/office/powerpoint/2010/main" val="4250869267"/>
+        <p14:creationId xmlns:p14="http://schemas.microsoft.com/office/powerpoint/2010/main" val="2209330273"/>
       </p:ext>
     </p:extLst>
   </p:cSld>
@@ -18182,7 +17862,7 @@
 </p:sld>
 </file>
 
-<file path=ppt/slides/slide3.xml><?xml version="1.0" encoding="utf-8"?>
+<file path=ppt/slides/slide11.xml><?xml version="1.0" encoding="utf-8"?>
 <p:sld xmlns:a="http://schemas.openxmlformats.org/drawingml/2006/main" xmlns:r="http://schemas.openxmlformats.org/officeDocument/2006/relationships" xmlns:p="http://schemas.openxmlformats.org/presentationml/2006/main">
   <p:cSld>
     <p:spTree>
@@ -18216,509 +17896,6 @@
           <a:p>
             <a:r>
               <a:rPr lang="de-DE" dirty="0" smtClean="0"/>
-              <a:t>Das Projektteam</a:t>
-            </a:r>
-            <a:endParaRPr lang="de-DE" dirty="0"/>
-          </a:p>
-        </p:txBody>
-      </p:sp>
-      <p:graphicFrame>
-        <p:nvGraphicFramePr>
-          <p:cNvPr id="4" name="Content Placeholder 3"/>
-          <p:cNvGraphicFramePr>
-            <a:graphicFrameLocks noGrp="1"/>
-          </p:cNvGraphicFramePr>
-          <p:nvPr>
-            <p:ph idx="1"/>
-            <p:extLst>
-              <p:ext uri="{D42A27DB-BD31-4B8C-83A1-F6EECF244321}">
-                <p14:modId xmlns:p14="http://schemas.microsoft.com/office/powerpoint/2010/main" val="3136100096"/>
-              </p:ext>
-            </p:extLst>
-          </p:nvPr>
-        </p:nvGraphicFramePr>
-        <p:xfrm>
-          <a:off x="1155700" y="2603500"/>
-          <a:ext cx="8761413" cy="3416300"/>
-        </p:xfrm>
-        <a:graphic>
-          <a:graphicData uri="http://schemas.openxmlformats.org/drawingml/2006/diagram">
-            <dgm:relIds xmlns:dgm="http://schemas.openxmlformats.org/drawingml/2006/diagram" xmlns:r="http://schemas.openxmlformats.org/officeDocument/2006/relationships" r:dm="rId2" r:lo="rId3" r:qs="rId4" r:cs="rId5"/>
-          </a:graphicData>
-        </a:graphic>
-      </p:graphicFrame>
-      <p:sp>
-        <p:nvSpPr>
-          <p:cNvPr id="5" name="TextBox 4"/>
-          <p:cNvSpPr txBox="1"/>
-          <p:nvPr/>
-        </p:nvSpPr>
-        <p:spPr>
-          <a:xfrm>
-            <a:off x="6117465" y="3026535"/>
-            <a:ext cx="2537138" cy="646331"/>
-          </a:xfrm>
-          <a:prstGeom prst="rect">
-            <a:avLst/>
-          </a:prstGeom>
-          <a:noFill/>
-        </p:spPr>
-        <p:txBody>
-          <a:bodyPr wrap="square" rtlCol="0">
-            <a:spAutoFit/>
-          </a:bodyPr>
-          <a:lstStyle/>
-          <a:p>
-            <a:r>
-              <a:rPr lang="de-DE" dirty="0" smtClean="0"/>
-              <a:t>Prof. DI Wilhelm </a:t>
-            </a:r>
-            <a:r>
-              <a:rPr lang="de-DE" dirty="0" err="1" smtClean="0"/>
-              <a:t>Hehenwarter</a:t>
-            </a:r>
-            <a:r>
-              <a:rPr lang="de-DE" dirty="0" smtClean="0"/>
-              <a:t> </a:t>
-            </a:r>
-            <a:endParaRPr lang="de-DE" dirty="0"/>
-          </a:p>
-        </p:txBody>
-      </p:sp>
-      <p:sp>
-        <p:nvSpPr>
-          <p:cNvPr id="8" name="TextBox 7"/>
-          <p:cNvSpPr txBox="1"/>
-          <p:nvPr/>
-        </p:nvSpPr>
-        <p:spPr>
-          <a:xfrm>
-            <a:off x="1738648" y="4687910"/>
-            <a:ext cx="1803042" cy="923330"/>
-          </a:xfrm>
-          <a:prstGeom prst="rect">
-            <a:avLst/>
-          </a:prstGeom>
-          <a:noFill/>
-        </p:spPr>
-        <p:txBody>
-          <a:bodyPr wrap="square" rtlCol="0">
-            <a:spAutoFit/>
-          </a:bodyPr>
-          <a:lstStyle/>
-          <a:p>
-            <a:pPr algn="r"/>
-            <a:r>
-              <a:rPr lang="de-DE" dirty="0" smtClean="0"/>
-              <a:t>Alexander </a:t>
-            </a:r>
-            <a:r>
-              <a:rPr lang="de-DE" dirty="0" err="1" smtClean="0"/>
-              <a:t>Bendl</a:t>
-            </a:r>
-            <a:r>
-              <a:rPr lang="de-DE" dirty="0" smtClean="0"/>
-              <a:t> (Projektleiter)</a:t>
-            </a:r>
-            <a:endParaRPr lang="de-DE" dirty="0"/>
-          </a:p>
-        </p:txBody>
-      </p:sp>
-      <p:sp>
-        <p:nvSpPr>
-          <p:cNvPr id="9" name="TextBox 8"/>
-          <p:cNvSpPr txBox="1"/>
-          <p:nvPr/>
-        </p:nvSpPr>
-        <p:spPr>
-          <a:xfrm>
-            <a:off x="7570632" y="4826409"/>
-            <a:ext cx="2537138" cy="646331"/>
-          </a:xfrm>
-          <a:prstGeom prst="rect">
-            <a:avLst/>
-          </a:prstGeom>
-          <a:noFill/>
-        </p:spPr>
-        <p:txBody>
-          <a:bodyPr wrap="square" rtlCol="0">
-            <a:spAutoFit/>
-          </a:bodyPr>
-          <a:lstStyle/>
-          <a:p>
-            <a:r>
-              <a:rPr lang="de-DE" dirty="0" smtClean="0"/>
-              <a:t>Milena</a:t>
-            </a:r>
-          </a:p>
-          <a:p>
-            <a:r>
-              <a:rPr lang="de-DE" dirty="0" smtClean="0"/>
-              <a:t>Matic</a:t>
-            </a:r>
-            <a:endParaRPr lang="de-DE" dirty="0"/>
-          </a:p>
-        </p:txBody>
-      </p:sp>
-      <p:sp>
-        <p:nvSpPr>
-          <p:cNvPr id="10" name="TextBox 9"/>
-          <p:cNvSpPr txBox="1"/>
-          <p:nvPr/>
-        </p:nvSpPr>
-        <p:spPr>
-          <a:xfrm>
-            <a:off x="4267091" y="6057466"/>
-            <a:ext cx="2537138" cy="369332"/>
-          </a:xfrm>
-          <a:prstGeom prst="rect">
-            <a:avLst/>
-          </a:prstGeom>
-          <a:noFill/>
-        </p:spPr>
-        <p:txBody>
-          <a:bodyPr wrap="square" rtlCol="0">
-            <a:spAutoFit/>
-          </a:bodyPr>
-          <a:lstStyle/>
-          <a:p>
-            <a:r>
-              <a:rPr lang="de-DE" dirty="0" smtClean="0"/>
-              <a:t>Ferdinand Brunauer</a:t>
-            </a:r>
-            <a:endParaRPr lang="de-DE" dirty="0"/>
-          </a:p>
-        </p:txBody>
-      </p:sp>
-    </p:spTree>
-    <p:extLst>
-      <p:ext uri="{BB962C8B-B14F-4D97-AF65-F5344CB8AC3E}">
-        <p14:creationId xmlns:p14="http://schemas.microsoft.com/office/powerpoint/2010/main" val="4259178872"/>
-      </p:ext>
-    </p:extLst>
-  </p:cSld>
-  <p:clrMapOvr>
-    <a:masterClrMapping/>
-  </p:clrMapOvr>
-  <p:timing>
-    <p:tnLst>
-      <p:par>
-        <p:cTn id="1" dur="indefinite" restart="never" nodeType="tmRoot"/>
-      </p:par>
-    </p:tnLst>
-  </p:timing>
-</p:sld>
-</file>
-
-<file path=ppt/slides/slide4.xml><?xml version="1.0" encoding="utf-8"?>
-<p:sld xmlns:a="http://schemas.openxmlformats.org/drawingml/2006/main" xmlns:r="http://schemas.openxmlformats.org/officeDocument/2006/relationships" xmlns:p="http://schemas.openxmlformats.org/presentationml/2006/main">
-  <p:cSld>
-    <p:spTree>
-      <p:nvGrpSpPr>
-        <p:cNvPr id="1" name=""/>
-        <p:cNvGrpSpPr/>
-        <p:nvPr/>
-      </p:nvGrpSpPr>
-      <p:grpSpPr>
-        <a:xfrm>
-          <a:off x="0" y="0"/>
-          <a:ext cx="0" cy="0"/>
-          <a:chOff x="0" y="0"/>
-          <a:chExt cx="0" cy="0"/>
-        </a:xfrm>
-      </p:grpSpPr>
-      <p:sp>
-        <p:nvSpPr>
-          <p:cNvPr id="2" name="Title 1"/>
-          <p:cNvSpPr>
-            <a:spLocks noGrp="1"/>
-          </p:cNvSpPr>
-          <p:nvPr>
-            <p:ph type="title"/>
-          </p:nvPr>
-        </p:nvSpPr>
-        <p:spPr/>
-        <p:txBody>
-          <a:bodyPr/>
-          <a:lstStyle/>
-          <a:p>
-            <a:r>
-              <a:rPr lang="de-DE" dirty="0" smtClean="0"/>
-              <a:t>Aufgabenstellung</a:t>
-            </a:r>
-            <a:endParaRPr lang="de-DE" dirty="0"/>
-          </a:p>
-        </p:txBody>
-      </p:sp>
-      <p:sp>
-        <p:nvSpPr>
-          <p:cNvPr id="3" name="Content Placeholder 2"/>
-          <p:cNvSpPr>
-            <a:spLocks noGrp="1"/>
-          </p:cNvSpPr>
-          <p:nvPr>
-            <p:ph idx="1"/>
-          </p:nvPr>
-        </p:nvSpPr>
-        <p:spPr/>
-        <p:txBody>
-          <a:bodyPr/>
-          <a:lstStyle/>
-          <a:p>
-            <a:r>
-              <a:rPr lang="de-DE" dirty="0" smtClean="0"/>
-              <a:t>Übertragung </a:t>
-            </a:r>
-            <a:r>
-              <a:rPr lang="de-DE" dirty="0"/>
-              <a:t>und Darstellung von </a:t>
-            </a:r>
-            <a:r>
-              <a:rPr lang="de-DE" dirty="0" smtClean="0"/>
-              <a:t>Informationen von </a:t>
-            </a:r>
-            <a:r>
-              <a:rPr lang="de-DE" dirty="0" err="1" smtClean="0"/>
-              <a:t>OpenData</a:t>
-            </a:r>
-            <a:r>
-              <a:rPr lang="de-DE" dirty="0" smtClean="0"/>
-              <a:t> </a:t>
-            </a:r>
-            <a:r>
-              <a:rPr lang="de-DE" dirty="0"/>
-              <a:t>in einer </a:t>
-            </a:r>
-            <a:r>
-              <a:rPr lang="de-DE" dirty="0" smtClean="0"/>
-              <a:t>Datenbrille</a:t>
-            </a:r>
-          </a:p>
-          <a:p>
-            <a:r>
-              <a:rPr lang="de-DE" dirty="0" smtClean="0"/>
-              <a:t>Zwei Anwendungsmöglichkeiten:</a:t>
-            </a:r>
-          </a:p>
-          <a:p>
-            <a:pPr lvl="1"/>
-            <a:r>
-              <a:rPr lang="de-DE" dirty="0" smtClean="0"/>
-              <a:t>Informationen über Sehenswürdigkeiten werden für Touristen visualisiert</a:t>
-            </a:r>
-          </a:p>
-          <a:p>
-            <a:pPr lvl="1"/>
-            <a:r>
-              <a:rPr lang="de-DE" dirty="0" smtClean="0"/>
-              <a:t>In einem Unternehmen werden Informationen über den Zustand der Einrichtung für </a:t>
-            </a:r>
-            <a:r>
-              <a:rPr lang="de-DE" smtClean="0"/>
-              <a:t>Firmenangehörige visualisiert</a:t>
-            </a:r>
-            <a:endParaRPr lang="de-DE" dirty="0" smtClean="0"/>
-          </a:p>
-        </p:txBody>
-      </p:sp>
-    </p:spTree>
-    <p:extLst>
-      <p:ext uri="{BB962C8B-B14F-4D97-AF65-F5344CB8AC3E}">
-        <p14:creationId xmlns:p14="http://schemas.microsoft.com/office/powerpoint/2010/main" val="3920834618"/>
-      </p:ext>
-    </p:extLst>
-  </p:cSld>
-  <p:clrMapOvr>
-    <a:masterClrMapping/>
-  </p:clrMapOvr>
-  <p:timing>
-    <p:tnLst>
-      <p:par>
-        <p:cTn id="1" dur="indefinite" restart="never" nodeType="tmRoot"/>
-      </p:par>
-    </p:tnLst>
-  </p:timing>
-</p:sld>
-</file>
-
-<file path=ppt/slides/slide5.xml><?xml version="1.0" encoding="utf-8"?>
-<p:sld xmlns:a="http://schemas.openxmlformats.org/drawingml/2006/main" xmlns:r="http://schemas.openxmlformats.org/officeDocument/2006/relationships" xmlns:p="http://schemas.openxmlformats.org/presentationml/2006/main">
-  <p:cSld>
-    <p:spTree>
-      <p:nvGrpSpPr>
-        <p:cNvPr id="1" name=""/>
-        <p:cNvGrpSpPr/>
-        <p:nvPr/>
-      </p:nvGrpSpPr>
-      <p:grpSpPr>
-        <a:xfrm>
-          <a:off x="0" y="0"/>
-          <a:ext cx="0" cy="0"/>
-          <a:chOff x="0" y="0"/>
-          <a:chExt cx="0" cy="0"/>
-        </a:xfrm>
-      </p:grpSpPr>
-      <p:sp>
-        <p:nvSpPr>
-          <p:cNvPr id="4" name="Title 3"/>
-          <p:cNvSpPr>
-            <a:spLocks noGrp="1"/>
-          </p:cNvSpPr>
-          <p:nvPr>
-            <p:ph type="title"/>
-          </p:nvPr>
-        </p:nvSpPr>
-        <p:spPr/>
-        <p:txBody>
-          <a:bodyPr/>
-          <a:lstStyle/>
-          <a:p>
-            <a:r>
-              <a:rPr lang="de-DE" dirty="0" smtClean="0"/>
-              <a:t>Ausgangs</a:t>
-            </a:r>
-            <a:r>
-              <a:rPr lang="de-DE" dirty="0" smtClean="0"/>
-              <a:t>situation</a:t>
-            </a:r>
-            <a:endParaRPr lang="de-DE" dirty="0"/>
-          </a:p>
-        </p:txBody>
-      </p:sp>
-      <p:sp>
-        <p:nvSpPr>
-          <p:cNvPr id="5" name="Content Placeholder 4"/>
-          <p:cNvSpPr>
-            <a:spLocks noGrp="1"/>
-          </p:cNvSpPr>
-          <p:nvPr>
-            <p:ph sz="half" idx="1"/>
-          </p:nvPr>
-        </p:nvSpPr>
-        <p:spPr/>
-        <p:txBody>
-          <a:bodyPr/>
-          <a:lstStyle/>
-          <a:p>
-            <a:r>
-              <a:rPr lang="de-DE" dirty="0" smtClean="0"/>
-              <a:t>Epson </a:t>
-            </a:r>
-            <a:r>
-              <a:rPr lang="de-DE" dirty="0" err="1" smtClean="0"/>
-              <a:t>Moverio</a:t>
-            </a:r>
-            <a:r>
-              <a:rPr lang="de-DE" dirty="0" smtClean="0"/>
-              <a:t> BT-100</a:t>
-            </a:r>
-          </a:p>
-          <a:p>
-            <a:endParaRPr lang="de-DE" dirty="0"/>
-          </a:p>
-          <a:p>
-            <a:r>
-              <a:rPr lang="de-DE" dirty="0" err="1" smtClean="0"/>
-              <a:t>OpenData</a:t>
-            </a:r>
-            <a:r>
-              <a:rPr lang="de-DE" dirty="0" smtClean="0"/>
-              <a:t>-Daten in </a:t>
-            </a:r>
-            <a:r>
-              <a:rPr lang="de-DE" dirty="0" err="1" smtClean="0"/>
-              <a:t>kmz</a:t>
-            </a:r>
-            <a:r>
-              <a:rPr lang="de-DE" dirty="0" smtClean="0"/>
-              <a:t>-Form</a:t>
-            </a:r>
-          </a:p>
-          <a:p>
-            <a:pPr lvl="1"/>
-            <a:r>
-              <a:rPr lang="de-DE" dirty="0" smtClean="0"/>
-              <a:t>Museen</a:t>
-            </a:r>
-            <a:endParaRPr lang="de-DE" dirty="0"/>
-          </a:p>
-        </p:txBody>
-      </p:sp>
-      <p:pic>
-        <p:nvPicPr>
-          <p:cNvPr id="7" name="Content Placeholder 6"/>
-          <p:cNvPicPr>
-            <a:picLocks noGrp="1" noChangeAspect="1"/>
-          </p:cNvPicPr>
-          <p:nvPr>
-            <p:ph sz="half" idx="2"/>
-          </p:nvPr>
-        </p:nvPicPr>
-        <p:blipFill rotWithShape="1">
-          <a:blip r:embed="rId2" cstate="print">
-            <a:extLst>
-              <a:ext uri="{28A0092B-C50C-407E-A947-70E740481C1C}">
-                <a14:useLocalDpi xmlns:a14="http://schemas.microsoft.com/office/drawing/2010/main" val="0"/>
-              </a:ext>
-            </a:extLst>
-          </a:blip>
-          <a:srcRect b="24193"/>
-          <a:stretch/>
-        </p:blipFill>
-        <p:spPr>
-          <a:xfrm>
-            <a:off x="6355906" y="2732289"/>
-            <a:ext cx="5546253" cy="3153356"/>
-          </a:xfrm>
-        </p:spPr>
-      </p:pic>
-    </p:spTree>
-    <p:extLst>
-      <p:ext uri="{BB962C8B-B14F-4D97-AF65-F5344CB8AC3E}">
-        <p14:creationId xmlns:p14="http://schemas.microsoft.com/office/powerpoint/2010/main" val="2777636541"/>
-      </p:ext>
-    </p:extLst>
-  </p:cSld>
-  <p:clrMapOvr>
-    <a:masterClrMapping/>
-  </p:clrMapOvr>
-</p:sld>
-</file>
-
-<file path=ppt/slides/slide6.xml><?xml version="1.0" encoding="utf-8"?>
-<p:sld xmlns:a="http://schemas.openxmlformats.org/drawingml/2006/main" xmlns:r="http://schemas.openxmlformats.org/officeDocument/2006/relationships" xmlns:p="http://schemas.openxmlformats.org/presentationml/2006/main">
-  <p:cSld>
-    <p:spTree>
-      <p:nvGrpSpPr>
-        <p:cNvPr id="1" name=""/>
-        <p:cNvGrpSpPr/>
-        <p:nvPr/>
-      </p:nvGrpSpPr>
-      <p:grpSpPr>
-        <a:xfrm>
-          <a:off x="0" y="0"/>
-          <a:ext cx="0" cy="0"/>
-          <a:chOff x="0" y="0"/>
-          <a:chExt cx="0" cy="0"/>
-        </a:xfrm>
-      </p:grpSpPr>
-      <p:sp>
-        <p:nvSpPr>
-          <p:cNvPr id="2" name="Title 1"/>
-          <p:cNvSpPr>
-            <a:spLocks noGrp="1"/>
-          </p:cNvSpPr>
-          <p:nvPr>
-            <p:ph type="title"/>
-          </p:nvPr>
-        </p:nvSpPr>
-        <p:spPr/>
-        <p:txBody>
-          <a:bodyPr/>
-          <a:lstStyle/>
-          <a:p>
-            <a:r>
-              <a:rPr lang="de-DE" dirty="0" smtClean="0"/>
               <a:t>Realisierung</a:t>
             </a:r>
             <a:endParaRPr lang="de-DE" dirty="0"/>
@@ -18740,33 +17917,64 @@
           <a:bodyPr/>
           <a:lstStyle/>
           <a:p>
-            <a:endParaRPr lang="de-DE"/>
+            <a:r>
+              <a:rPr lang="de-DE" dirty="0" smtClean="0"/>
+              <a:t>Beispiel eines Datenpunktes anhand der Festung Hohensalzburg</a:t>
+            </a:r>
+          </a:p>
+          <a:p>
+            <a:r>
+              <a:rPr lang="de-DE" dirty="0" smtClean="0"/>
+              <a:t>Paket „Museen Land Salzburg“</a:t>
+            </a:r>
           </a:p>
         </p:txBody>
       </p:sp>
-      <p:sp>
-        <p:nvSpPr>
-          <p:cNvPr id="4" name="Content Placeholder 3"/>
-          <p:cNvSpPr>
-            <a:spLocks noGrp="1"/>
-          </p:cNvSpPr>
+      <p:pic>
+        <p:nvPicPr>
+          <p:cNvPr id="5" name="Content Placeholder 4"/>
+          <p:cNvPicPr>
+            <a:picLocks noGrp="1" noChangeAspect="1"/>
+          </p:cNvPicPr>
           <p:nvPr>
             <p:ph sz="half" idx="2"/>
           </p:nvPr>
-        </p:nvSpPr>
-        <p:spPr/>
-        <p:txBody>
-          <a:bodyPr/>
-          <a:lstStyle/>
-          <a:p>
-            <a:endParaRPr lang="de-DE"/>
-          </a:p>
-        </p:txBody>
-      </p:sp>
+        </p:nvPicPr>
+        <p:blipFill rotWithShape="1">
+          <a:blip r:embed="rId2" cstate="print">
+            <a:extLst>
+              <a:ext uri="{28A0092B-C50C-407E-A947-70E740481C1C}">
+                <a14:useLocalDpi xmlns:a14="http://schemas.microsoft.com/office/drawing/2010/main" val="0"/>
+              </a:ext>
+            </a:extLst>
+          </a:blip>
+          <a:srcRect t="3933"/>
+          <a:stretch/>
+        </p:blipFill>
+        <p:spPr>
+          <a:xfrm>
+            <a:off x="7597665" y="2331650"/>
+            <a:ext cx="2318702" cy="3960000"/>
+          </a:xfrm>
+          <a:prstGeom prst="rect">
+            <a:avLst/>
+          </a:prstGeom>
+          <a:ln>
+            <a:noFill/>
+          </a:ln>
+          <a:effectLst>
+            <a:outerShdw blurRad="190500" algn="tl" rotWithShape="0">
+              <a:srgbClr val="000000">
+                <a:alpha val="70000"/>
+              </a:srgbClr>
+            </a:outerShdw>
+          </a:effectLst>
+        </p:spPr>
+      </p:pic>
     </p:spTree>
     <p:extLst>
       <p:ext uri="{BB962C8B-B14F-4D97-AF65-F5344CB8AC3E}">
-        <p14:creationId xmlns:p14="http://schemas.microsoft.com/office/powerpoint/2010/main" val="87718694"/>
+        <p14:creationId xmlns:p14="http://schemas.microsoft.com/office/powerpoint/2010/main" val="1934329478"/>
       </p:ext>
     </p:extLst>
   </p:cSld>
@@ -18776,7 +17984,7 @@
 </p:sld>
 </file>
 
-<file path=ppt/slides/slide7.xml><?xml version="1.0" encoding="utf-8"?>
+<file path=ppt/slides/slide12.xml><?xml version="1.0" encoding="utf-8"?>
 <p:sld xmlns:a="http://schemas.openxmlformats.org/drawingml/2006/main" xmlns:r="http://schemas.openxmlformats.org/officeDocument/2006/relationships" xmlns:p="http://schemas.openxmlformats.org/presentationml/2006/main">
   <p:cSld>
     <p:spTree>
@@ -19015,6 +18223,1424 @@
     <p:extLst>
       <p:ext uri="{BB962C8B-B14F-4D97-AF65-F5344CB8AC3E}">
         <p14:creationId xmlns:p14="http://schemas.microsoft.com/office/powerpoint/2010/main" val="1925275947"/>
+      </p:ext>
+    </p:extLst>
+  </p:cSld>
+  <p:clrMapOvr>
+    <a:masterClrMapping/>
+  </p:clrMapOvr>
+  <p:timing>
+    <p:tnLst>
+      <p:par>
+        <p:cTn id="1" dur="indefinite" restart="never" nodeType="tmRoot"/>
+      </p:par>
+    </p:tnLst>
+  </p:timing>
+</p:sld>
+</file>
+
+<file path=ppt/slides/slide13.xml><?xml version="1.0" encoding="utf-8"?>
+<p:sld xmlns:a="http://schemas.openxmlformats.org/drawingml/2006/main" xmlns:r="http://schemas.openxmlformats.org/officeDocument/2006/relationships" xmlns:p="http://schemas.openxmlformats.org/presentationml/2006/main">
+  <p:cSld>
+    <p:spTree>
+      <p:nvGrpSpPr>
+        <p:cNvPr id="1" name=""/>
+        <p:cNvGrpSpPr/>
+        <p:nvPr/>
+      </p:nvGrpSpPr>
+      <p:grpSpPr>
+        <a:xfrm>
+          <a:off x="0" y="0"/>
+          <a:ext cx="0" cy="0"/>
+          <a:chOff x="0" y="0"/>
+          <a:chExt cx="0" cy="0"/>
+        </a:xfrm>
+      </p:grpSpPr>
+      <p:sp>
+        <p:nvSpPr>
+          <p:cNvPr id="4" name="Title 3"/>
+          <p:cNvSpPr>
+            <a:spLocks noGrp="1"/>
+          </p:cNvSpPr>
+          <p:nvPr>
+            <p:ph type="ctrTitle"/>
+          </p:nvPr>
+        </p:nvSpPr>
+        <p:spPr/>
+        <p:txBody>
+          <a:bodyPr/>
+          <a:lstStyle/>
+          <a:p>
+            <a:r>
+              <a:rPr lang="de-DE" dirty="0" smtClean="0"/>
+              <a:t>Danke für Ihre Aufmerksamkeit</a:t>
+            </a:r>
+            <a:endParaRPr lang="de-DE" dirty="0"/>
+          </a:p>
+        </p:txBody>
+      </p:sp>
+      <p:sp>
+        <p:nvSpPr>
+          <p:cNvPr id="5" name="Subtitle 4"/>
+          <p:cNvSpPr>
+            <a:spLocks noGrp="1"/>
+          </p:cNvSpPr>
+          <p:nvPr>
+            <p:ph type="subTitle" idx="1"/>
+          </p:nvPr>
+        </p:nvSpPr>
+        <p:spPr/>
+        <p:txBody>
+          <a:bodyPr/>
+          <a:lstStyle/>
+          <a:p>
+            <a:endParaRPr lang="de-DE"/>
+          </a:p>
+        </p:txBody>
+      </p:sp>
+    </p:spTree>
+    <p:extLst>
+      <p:ext uri="{BB962C8B-B14F-4D97-AF65-F5344CB8AC3E}">
+        <p14:creationId xmlns:p14="http://schemas.microsoft.com/office/powerpoint/2010/main" val="3177119384"/>
+      </p:ext>
+    </p:extLst>
+  </p:cSld>
+  <p:clrMapOvr>
+    <a:masterClrMapping/>
+  </p:clrMapOvr>
+</p:sld>
+</file>
+
+<file path=ppt/slides/slide2.xml><?xml version="1.0" encoding="utf-8"?>
+<p:sld xmlns:a="http://schemas.openxmlformats.org/drawingml/2006/main" xmlns:r="http://schemas.openxmlformats.org/officeDocument/2006/relationships" xmlns:p="http://schemas.openxmlformats.org/presentationml/2006/main">
+  <p:cSld>
+    <p:spTree>
+      <p:nvGrpSpPr>
+        <p:cNvPr id="1" name=""/>
+        <p:cNvGrpSpPr/>
+        <p:nvPr/>
+      </p:nvGrpSpPr>
+      <p:grpSpPr>
+        <a:xfrm>
+          <a:off x="0" y="0"/>
+          <a:ext cx="0" cy="0"/>
+          <a:chOff x="0" y="0"/>
+          <a:chExt cx="0" cy="0"/>
+        </a:xfrm>
+      </p:grpSpPr>
+      <p:sp>
+        <p:nvSpPr>
+          <p:cNvPr id="2" name="Title 1"/>
+          <p:cNvSpPr>
+            <a:spLocks noGrp="1"/>
+          </p:cNvSpPr>
+          <p:nvPr>
+            <p:ph type="title"/>
+          </p:nvPr>
+        </p:nvSpPr>
+        <p:spPr/>
+        <p:txBody>
+          <a:bodyPr/>
+          <a:lstStyle/>
+          <a:p>
+            <a:r>
+              <a:rPr lang="de-DE" dirty="0" smtClean="0"/>
+              <a:t>Gliederung</a:t>
+            </a:r>
+            <a:endParaRPr lang="de-DE" dirty="0"/>
+          </a:p>
+        </p:txBody>
+      </p:sp>
+      <p:sp>
+        <p:nvSpPr>
+          <p:cNvPr id="3" name="Content Placeholder 2"/>
+          <p:cNvSpPr>
+            <a:spLocks noGrp="1"/>
+          </p:cNvSpPr>
+          <p:nvPr>
+            <p:ph idx="1"/>
+          </p:nvPr>
+        </p:nvSpPr>
+        <p:spPr/>
+        <p:txBody>
+          <a:bodyPr/>
+          <a:lstStyle/>
+          <a:p>
+            <a:r>
+              <a:rPr lang="de-DE" dirty="0" smtClean="0"/>
+              <a:t>Projektteam</a:t>
+            </a:r>
+          </a:p>
+          <a:p>
+            <a:r>
+              <a:rPr lang="de-DE" dirty="0" smtClean="0"/>
+              <a:t>Aufgabenstellung</a:t>
+            </a:r>
+          </a:p>
+          <a:p>
+            <a:r>
+              <a:rPr lang="de-DE" dirty="0" smtClean="0"/>
+              <a:t>Ausgangssituation</a:t>
+            </a:r>
+          </a:p>
+          <a:p>
+            <a:r>
+              <a:rPr lang="de-DE" smtClean="0"/>
+              <a:t>Realisierung</a:t>
+            </a:r>
+            <a:endParaRPr lang="de-DE" dirty="0" smtClean="0"/>
+          </a:p>
+          <a:p>
+            <a:r>
+              <a:rPr lang="de-DE" dirty="0" smtClean="0"/>
+              <a:t>Danksagung</a:t>
+            </a:r>
+          </a:p>
+        </p:txBody>
+      </p:sp>
+    </p:spTree>
+    <p:extLst>
+      <p:ext uri="{BB962C8B-B14F-4D97-AF65-F5344CB8AC3E}">
+        <p14:creationId xmlns:p14="http://schemas.microsoft.com/office/powerpoint/2010/main" val="4250869267"/>
+      </p:ext>
+    </p:extLst>
+  </p:cSld>
+  <p:clrMapOvr>
+    <a:masterClrMapping/>
+  </p:clrMapOvr>
+  <p:timing>
+    <p:tnLst>
+      <p:par>
+        <p:cTn id="1" dur="indefinite" restart="never" nodeType="tmRoot"/>
+      </p:par>
+    </p:tnLst>
+  </p:timing>
+</p:sld>
+</file>
+
+<file path=ppt/slides/slide3.xml><?xml version="1.0" encoding="utf-8"?>
+<p:sld xmlns:a="http://schemas.openxmlformats.org/drawingml/2006/main" xmlns:r="http://schemas.openxmlformats.org/officeDocument/2006/relationships" xmlns:p="http://schemas.openxmlformats.org/presentationml/2006/main">
+  <p:cSld>
+    <p:spTree>
+      <p:nvGrpSpPr>
+        <p:cNvPr id="1" name=""/>
+        <p:cNvGrpSpPr/>
+        <p:nvPr/>
+      </p:nvGrpSpPr>
+      <p:grpSpPr>
+        <a:xfrm>
+          <a:off x="0" y="0"/>
+          <a:ext cx="0" cy="0"/>
+          <a:chOff x="0" y="0"/>
+          <a:chExt cx="0" cy="0"/>
+        </a:xfrm>
+      </p:grpSpPr>
+      <p:sp>
+        <p:nvSpPr>
+          <p:cNvPr id="2" name="Title 1"/>
+          <p:cNvSpPr>
+            <a:spLocks noGrp="1"/>
+          </p:cNvSpPr>
+          <p:nvPr>
+            <p:ph type="title"/>
+          </p:nvPr>
+        </p:nvSpPr>
+        <p:spPr/>
+        <p:txBody>
+          <a:bodyPr/>
+          <a:lstStyle/>
+          <a:p>
+            <a:r>
+              <a:rPr lang="de-DE" dirty="0" smtClean="0"/>
+              <a:t>Das Projektteam</a:t>
+            </a:r>
+            <a:endParaRPr lang="de-DE" dirty="0"/>
+          </a:p>
+        </p:txBody>
+      </p:sp>
+      <p:graphicFrame>
+        <p:nvGraphicFramePr>
+          <p:cNvPr id="4" name="Content Placeholder 3"/>
+          <p:cNvGraphicFramePr>
+            <a:graphicFrameLocks noGrp="1"/>
+          </p:cNvGraphicFramePr>
+          <p:nvPr>
+            <p:ph idx="1"/>
+            <p:extLst>
+              <p:ext uri="{D42A27DB-BD31-4B8C-83A1-F6EECF244321}">
+                <p14:modId xmlns:p14="http://schemas.microsoft.com/office/powerpoint/2010/main" val="4268575913"/>
+              </p:ext>
+            </p:extLst>
+          </p:nvPr>
+        </p:nvGraphicFramePr>
+        <p:xfrm>
+          <a:off x="1155700" y="2603500"/>
+          <a:ext cx="8761413" cy="3416300"/>
+        </p:xfrm>
+        <a:graphic>
+          <a:graphicData uri="http://schemas.openxmlformats.org/drawingml/2006/diagram">
+            <dgm:relIds xmlns:dgm="http://schemas.openxmlformats.org/drawingml/2006/diagram" xmlns:r="http://schemas.openxmlformats.org/officeDocument/2006/relationships" r:dm="rId2" r:lo="rId3" r:qs="rId4" r:cs="rId5"/>
+          </a:graphicData>
+        </a:graphic>
+      </p:graphicFrame>
+      <p:sp>
+        <p:nvSpPr>
+          <p:cNvPr id="5" name="TextBox 4"/>
+          <p:cNvSpPr txBox="1"/>
+          <p:nvPr/>
+        </p:nvSpPr>
+        <p:spPr>
+          <a:xfrm>
+            <a:off x="6117465" y="3026535"/>
+            <a:ext cx="2537138" cy="646331"/>
+          </a:xfrm>
+          <a:prstGeom prst="rect">
+            <a:avLst/>
+          </a:prstGeom>
+          <a:noFill/>
+        </p:spPr>
+        <p:txBody>
+          <a:bodyPr wrap="square" rtlCol="0">
+            <a:spAutoFit/>
+          </a:bodyPr>
+          <a:lstStyle/>
+          <a:p>
+            <a:r>
+              <a:rPr lang="de-DE" dirty="0" smtClean="0"/>
+              <a:t>Prof. DI Wilhelm </a:t>
+            </a:r>
+            <a:r>
+              <a:rPr lang="de-DE" dirty="0" err="1" smtClean="0"/>
+              <a:t>Hehenwarter</a:t>
+            </a:r>
+            <a:r>
+              <a:rPr lang="de-DE" dirty="0" smtClean="0"/>
+              <a:t> </a:t>
+            </a:r>
+            <a:endParaRPr lang="de-DE" dirty="0"/>
+          </a:p>
+        </p:txBody>
+      </p:sp>
+      <p:sp>
+        <p:nvSpPr>
+          <p:cNvPr id="8" name="TextBox 7"/>
+          <p:cNvSpPr txBox="1"/>
+          <p:nvPr/>
+        </p:nvSpPr>
+        <p:spPr>
+          <a:xfrm>
+            <a:off x="1738648" y="4687910"/>
+            <a:ext cx="1803042" cy="923330"/>
+          </a:xfrm>
+          <a:prstGeom prst="rect">
+            <a:avLst/>
+          </a:prstGeom>
+          <a:noFill/>
+        </p:spPr>
+        <p:txBody>
+          <a:bodyPr wrap="square" rtlCol="0">
+            <a:spAutoFit/>
+          </a:bodyPr>
+          <a:lstStyle/>
+          <a:p>
+            <a:pPr algn="r"/>
+            <a:r>
+              <a:rPr lang="de-DE" dirty="0" smtClean="0"/>
+              <a:t>Alexander </a:t>
+            </a:r>
+            <a:r>
+              <a:rPr lang="de-DE" dirty="0" err="1" smtClean="0"/>
+              <a:t>Bendl</a:t>
+            </a:r>
+            <a:r>
+              <a:rPr lang="de-DE" dirty="0" smtClean="0"/>
+              <a:t> (Projektleiter)</a:t>
+            </a:r>
+            <a:endParaRPr lang="de-DE" dirty="0"/>
+          </a:p>
+        </p:txBody>
+      </p:sp>
+      <p:sp>
+        <p:nvSpPr>
+          <p:cNvPr id="9" name="TextBox 8"/>
+          <p:cNvSpPr txBox="1"/>
+          <p:nvPr/>
+        </p:nvSpPr>
+        <p:spPr>
+          <a:xfrm>
+            <a:off x="7570632" y="4826409"/>
+            <a:ext cx="2537138" cy="646331"/>
+          </a:xfrm>
+          <a:prstGeom prst="rect">
+            <a:avLst/>
+          </a:prstGeom>
+          <a:noFill/>
+        </p:spPr>
+        <p:txBody>
+          <a:bodyPr wrap="square" rtlCol="0">
+            <a:spAutoFit/>
+          </a:bodyPr>
+          <a:lstStyle/>
+          <a:p>
+            <a:r>
+              <a:rPr lang="de-DE" dirty="0" smtClean="0"/>
+              <a:t>Milena</a:t>
+            </a:r>
+          </a:p>
+          <a:p>
+            <a:r>
+              <a:rPr lang="de-DE" dirty="0" smtClean="0"/>
+              <a:t>Matic</a:t>
+            </a:r>
+            <a:endParaRPr lang="de-DE" dirty="0"/>
+          </a:p>
+        </p:txBody>
+      </p:sp>
+      <p:sp>
+        <p:nvSpPr>
+          <p:cNvPr id="10" name="TextBox 9"/>
+          <p:cNvSpPr txBox="1"/>
+          <p:nvPr/>
+        </p:nvSpPr>
+        <p:spPr>
+          <a:xfrm>
+            <a:off x="4267091" y="6057466"/>
+            <a:ext cx="2537138" cy="369332"/>
+          </a:xfrm>
+          <a:prstGeom prst="rect">
+            <a:avLst/>
+          </a:prstGeom>
+          <a:noFill/>
+        </p:spPr>
+        <p:txBody>
+          <a:bodyPr wrap="square" rtlCol="0">
+            <a:spAutoFit/>
+          </a:bodyPr>
+          <a:lstStyle/>
+          <a:p>
+            <a:r>
+              <a:rPr lang="de-DE" dirty="0" smtClean="0"/>
+              <a:t>Ferdinand Brunauer</a:t>
+            </a:r>
+            <a:endParaRPr lang="de-DE" dirty="0"/>
+          </a:p>
+        </p:txBody>
+      </p:sp>
+    </p:spTree>
+    <p:extLst>
+      <p:ext uri="{BB962C8B-B14F-4D97-AF65-F5344CB8AC3E}">
+        <p14:creationId xmlns:p14="http://schemas.microsoft.com/office/powerpoint/2010/main" val="4259178872"/>
+      </p:ext>
+    </p:extLst>
+  </p:cSld>
+  <p:clrMapOvr>
+    <a:masterClrMapping/>
+  </p:clrMapOvr>
+  <p:timing>
+    <p:tnLst>
+      <p:par>
+        <p:cTn id="1" dur="indefinite" restart="never" nodeType="tmRoot"/>
+      </p:par>
+    </p:tnLst>
+  </p:timing>
+</p:sld>
+</file>
+
+<file path=ppt/slides/slide4.xml><?xml version="1.0" encoding="utf-8"?>
+<p:sld xmlns:a="http://schemas.openxmlformats.org/drawingml/2006/main" xmlns:r="http://schemas.openxmlformats.org/officeDocument/2006/relationships" xmlns:p="http://schemas.openxmlformats.org/presentationml/2006/main">
+  <p:cSld>
+    <p:spTree>
+      <p:nvGrpSpPr>
+        <p:cNvPr id="1" name=""/>
+        <p:cNvGrpSpPr/>
+        <p:nvPr/>
+      </p:nvGrpSpPr>
+      <p:grpSpPr>
+        <a:xfrm>
+          <a:off x="0" y="0"/>
+          <a:ext cx="0" cy="0"/>
+          <a:chOff x="0" y="0"/>
+          <a:chExt cx="0" cy="0"/>
+        </a:xfrm>
+      </p:grpSpPr>
+      <p:sp>
+        <p:nvSpPr>
+          <p:cNvPr id="2" name="Title 1"/>
+          <p:cNvSpPr>
+            <a:spLocks noGrp="1"/>
+          </p:cNvSpPr>
+          <p:nvPr>
+            <p:ph type="title"/>
+          </p:nvPr>
+        </p:nvSpPr>
+        <p:spPr/>
+        <p:txBody>
+          <a:bodyPr/>
+          <a:lstStyle/>
+          <a:p>
+            <a:r>
+              <a:rPr lang="de-DE" dirty="0" smtClean="0"/>
+              <a:t>Aufgabenstellung</a:t>
+            </a:r>
+            <a:endParaRPr lang="de-DE" dirty="0"/>
+          </a:p>
+        </p:txBody>
+      </p:sp>
+      <p:sp>
+        <p:nvSpPr>
+          <p:cNvPr id="3" name="Content Placeholder 2"/>
+          <p:cNvSpPr>
+            <a:spLocks noGrp="1"/>
+          </p:cNvSpPr>
+          <p:nvPr>
+            <p:ph idx="1"/>
+          </p:nvPr>
+        </p:nvSpPr>
+        <p:spPr/>
+        <p:txBody>
+          <a:bodyPr/>
+          <a:lstStyle/>
+          <a:p>
+            <a:r>
+              <a:rPr lang="de-DE" dirty="0" smtClean="0"/>
+              <a:t>Übertragung </a:t>
+            </a:r>
+            <a:r>
+              <a:rPr lang="de-DE" dirty="0"/>
+              <a:t>und Darstellung von </a:t>
+            </a:r>
+            <a:r>
+              <a:rPr lang="de-DE" dirty="0" smtClean="0"/>
+              <a:t>Informationen von </a:t>
+            </a:r>
+            <a:r>
+              <a:rPr lang="de-DE" dirty="0" err="1" smtClean="0"/>
+              <a:t>OpenData</a:t>
+            </a:r>
+            <a:r>
+              <a:rPr lang="de-DE" dirty="0" smtClean="0"/>
+              <a:t> in </a:t>
+            </a:r>
+            <a:r>
+              <a:rPr lang="de-DE" dirty="0"/>
+              <a:t>einer </a:t>
+            </a:r>
+            <a:r>
+              <a:rPr lang="de-DE" dirty="0" smtClean="0"/>
+              <a:t>Datenbrille</a:t>
+            </a:r>
+          </a:p>
+          <a:p>
+            <a:r>
+              <a:rPr lang="de-DE" dirty="0" err="1" smtClean="0"/>
+              <a:t>OpenData</a:t>
+            </a:r>
+            <a:r>
+              <a:rPr lang="de-DE" dirty="0"/>
+              <a:t>-Daten: mit Koordinaten versehene Datenpakete der Stadt und des Landes Salzburg</a:t>
+            </a:r>
+            <a:r>
+              <a:rPr lang="de-DE" dirty="0" smtClean="0"/>
+              <a:t>)</a:t>
+            </a:r>
+            <a:endParaRPr lang="de-DE" dirty="0" smtClean="0"/>
+          </a:p>
+          <a:p>
+            <a:r>
+              <a:rPr lang="de-DE" dirty="0" smtClean="0"/>
+              <a:t>Zwei Anwendungsmöglichkeiten:</a:t>
+            </a:r>
+          </a:p>
+          <a:p>
+            <a:pPr lvl="1"/>
+            <a:r>
+              <a:rPr lang="de-DE" dirty="0" smtClean="0"/>
+              <a:t>Informationen über Sehenswürdigkeiten werden für Touristen visualisiert</a:t>
+            </a:r>
+          </a:p>
+          <a:p>
+            <a:pPr lvl="1"/>
+            <a:r>
+              <a:rPr lang="de-DE" dirty="0" smtClean="0"/>
+              <a:t>In einem Unternehmen werden Informationen über den Zustand der Einrichtung für Firmenangehörige visualisiert</a:t>
+            </a:r>
+          </a:p>
+        </p:txBody>
+      </p:sp>
+    </p:spTree>
+    <p:extLst>
+      <p:ext uri="{BB962C8B-B14F-4D97-AF65-F5344CB8AC3E}">
+        <p14:creationId xmlns:p14="http://schemas.microsoft.com/office/powerpoint/2010/main" val="3920834618"/>
+      </p:ext>
+    </p:extLst>
+  </p:cSld>
+  <p:clrMapOvr>
+    <a:masterClrMapping/>
+  </p:clrMapOvr>
+  <p:timing>
+    <p:tnLst>
+      <p:par>
+        <p:cTn id="1" dur="indefinite" restart="never" nodeType="tmRoot"/>
+      </p:par>
+    </p:tnLst>
+  </p:timing>
+</p:sld>
+</file>
+
+<file path=ppt/slides/slide5.xml><?xml version="1.0" encoding="utf-8"?>
+<p:sld xmlns:a="http://schemas.openxmlformats.org/drawingml/2006/main" xmlns:r="http://schemas.openxmlformats.org/officeDocument/2006/relationships" xmlns:p="http://schemas.openxmlformats.org/presentationml/2006/main">
+  <p:cSld>
+    <p:spTree>
+      <p:nvGrpSpPr>
+        <p:cNvPr id="1" name=""/>
+        <p:cNvGrpSpPr/>
+        <p:nvPr/>
+      </p:nvGrpSpPr>
+      <p:grpSpPr>
+        <a:xfrm>
+          <a:off x="0" y="0"/>
+          <a:ext cx="0" cy="0"/>
+          <a:chOff x="0" y="0"/>
+          <a:chExt cx="0" cy="0"/>
+        </a:xfrm>
+      </p:grpSpPr>
+      <p:sp>
+        <p:nvSpPr>
+          <p:cNvPr id="4" name="Title 3"/>
+          <p:cNvSpPr>
+            <a:spLocks noGrp="1"/>
+          </p:cNvSpPr>
+          <p:nvPr>
+            <p:ph type="title"/>
+          </p:nvPr>
+        </p:nvSpPr>
+        <p:spPr/>
+        <p:txBody>
+          <a:bodyPr/>
+          <a:lstStyle/>
+          <a:p>
+            <a:r>
+              <a:rPr lang="de-DE" dirty="0" smtClean="0"/>
+              <a:t>Ausgangssituation</a:t>
+            </a:r>
+            <a:endParaRPr lang="de-DE" dirty="0"/>
+          </a:p>
+        </p:txBody>
+      </p:sp>
+      <p:sp>
+        <p:nvSpPr>
+          <p:cNvPr id="5" name="Content Placeholder 4"/>
+          <p:cNvSpPr>
+            <a:spLocks noGrp="1"/>
+          </p:cNvSpPr>
+          <p:nvPr>
+            <p:ph sz="half" idx="1"/>
+          </p:nvPr>
+        </p:nvSpPr>
+        <p:spPr/>
+        <p:txBody>
+          <a:bodyPr/>
+          <a:lstStyle/>
+          <a:p>
+            <a:r>
+              <a:rPr lang="de-DE" dirty="0" smtClean="0"/>
+              <a:t>Epson </a:t>
+            </a:r>
+            <a:r>
+              <a:rPr lang="de-DE" dirty="0" err="1" smtClean="0"/>
+              <a:t>Moverio</a:t>
+            </a:r>
+            <a:r>
+              <a:rPr lang="de-DE" dirty="0" smtClean="0"/>
+              <a:t> BT-100</a:t>
+            </a:r>
+          </a:p>
+          <a:p>
+            <a:endParaRPr lang="de-DE" dirty="0"/>
+          </a:p>
+          <a:p>
+            <a:r>
+              <a:rPr lang="de-DE" dirty="0" err="1" smtClean="0"/>
+              <a:t>OpenData</a:t>
+            </a:r>
+            <a:r>
+              <a:rPr lang="de-DE" dirty="0" smtClean="0"/>
+              <a:t>-Daten in </a:t>
+            </a:r>
+            <a:r>
+              <a:rPr lang="de-DE" dirty="0" err="1" smtClean="0"/>
+              <a:t>kmz</a:t>
+            </a:r>
+            <a:r>
+              <a:rPr lang="de-DE" dirty="0" smtClean="0"/>
+              <a:t>- &amp; </a:t>
+            </a:r>
+            <a:r>
+              <a:rPr lang="de-DE" dirty="0" err="1" smtClean="0"/>
+              <a:t>kml</a:t>
+            </a:r>
+            <a:r>
+              <a:rPr lang="de-DE" dirty="0" smtClean="0"/>
+              <a:t>-Form</a:t>
+            </a:r>
+          </a:p>
+          <a:p>
+            <a:pPr lvl="1"/>
+            <a:r>
+              <a:rPr lang="de-DE" dirty="0" smtClean="0"/>
+              <a:t>Museen</a:t>
+            </a:r>
+            <a:endParaRPr lang="de-DE" dirty="0"/>
+          </a:p>
+        </p:txBody>
+      </p:sp>
+      <p:pic>
+        <p:nvPicPr>
+          <p:cNvPr id="7" name="Content Placeholder 6"/>
+          <p:cNvPicPr>
+            <a:picLocks noGrp="1" noChangeAspect="1"/>
+          </p:cNvPicPr>
+          <p:nvPr>
+            <p:ph sz="half" idx="2"/>
+          </p:nvPr>
+        </p:nvPicPr>
+        <p:blipFill rotWithShape="1">
+          <a:blip r:embed="rId2" cstate="print">
+            <a:extLst>
+              <a:ext uri="{28A0092B-C50C-407E-A947-70E740481C1C}">
+                <a14:useLocalDpi xmlns:a14="http://schemas.microsoft.com/office/drawing/2010/main" val="0"/>
+              </a:ext>
+            </a:extLst>
+          </a:blip>
+          <a:srcRect b="24193"/>
+          <a:stretch/>
+        </p:blipFill>
+        <p:spPr>
+          <a:xfrm>
+            <a:off x="6355906" y="2732289"/>
+            <a:ext cx="5546253" cy="3153356"/>
+          </a:xfrm>
+        </p:spPr>
+      </p:pic>
+    </p:spTree>
+    <p:extLst>
+      <p:ext uri="{BB962C8B-B14F-4D97-AF65-F5344CB8AC3E}">
+        <p14:creationId xmlns:p14="http://schemas.microsoft.com/office/powerpoint/2010/main" val="2777636541"/>
+      </p:ext>
+    </p:extLst>
+  </p:cSld>
+  <p:clrMapOvr>
+    <a:masterClrMapping/>
+  </p:clrMapOvr>
+  <p:timing>
+    <p:tnLst>
+      <p:par>
+        <p:cTn id="1" dur="indefinite" restart="never" nodeType="tmRoot"/>
+      </p:par>
+    </p:tnLst>
+  </p:timing>
+</p:sld>
+</file>
+
+<file path=ppt/slides/slide6.xml><?xml version="1.0" encoding="utf-8"?>
+<p:sld xmlns:a="http://schemas.openxmlformats.org/drawingml/2006/main" xmlns:r="http://schemas.openxmlformats.org/officeDocument/2006/relationships" xmlns:p="http://schemas.openxmlformats.org/presentationml/2006/main">
+  <p:cSld>
+    <p:spTree>
+      <p:nvGrpSpPr>
+        <p:cNvPr id="1" name=""/>
+        <p:cNvGrpSpPr/>
+        <p:nvPr/>
+      </p:nvGrpSpPr>
+      <p:grpSpPr>
+        <a:xfrm>
+          <a:off x="0" y="0"/>
+          <a:ext cx="0" cy="0"/>
+          <a:chOff x="0" y="0"/>
+          <a:chExt cx="0" cy="0"/>
+        </a:xfrm>
+      </p:grpSpPr>
+      <p:sp>
+        <p:nvSpPr>
+          <p:cNvPr id="2" name="Title 1"/>
+          <p:cNvSpPr>
+            <a:spLocks noGrp="1"/>
+          </p:cNvSpPr>
+          <p:nvPr>
+            <p:ph type="title"/>
+          </p:nvPr>
+        </p:nvSpPr>
+        <p:spPr/>
+        <p:txBody>
+          <a:bodyPr/>
+          <a:lstStyle/>
+          <a:p>
+            <a:r>
+              <a:rPr lang="de-DE" dirty="0" smtClean="0"/>
+              <a:t>Realisierung</a:t>
+            </a:r>
+            <a:endParaRPr lang="de-DE" dirty="0"/>
+          </a:p>
+        </p:txBody>
+      </p:sp>
+      <p:sp>
+        <p:nvSpPr>
+          <p:cNvPr id="3" name="Content Placeholder 2"/>
+          <p:cNvSpPr>
+            <a:spLocks noGrp="1"/>
+          </p:cNvSpPr>
+          <p:nvPr>
+            <p:ph idx="1"/>
+          </p:nvPr>
+        </p:nvSpPr>
+        <p:spPr/>
+        <p:txBody>
+          <a:bodyPr/>
+          <a:lstStyle/>
+          <a:p>
+            <a:r>
+              <a:rPr lang="de-DE" dirty="0" smtClean="0"/>
+              <a:t>Unterstützte Medien:</a:t>
+            </a:r>
+          </a:p>
+          <a:p>
+            <a:pPr lvl="1"/>
+            <a:r>
+              <a:rPr lang="de-DE" dirty="0" smtClean="0"/>
+              <a:t>GPS</a:t>
+            </a:r>
+          </a:p>
+          <a:p>
+            <a:pPr lvl="1"/>
+            <a:r>
+              <a:rPr lang="de-DE" dirty="0" smtClean="0"/>
+              <a:t>NFC</a:t>
+            </a:r>
+          </a:p>
+          <a:p>
+            <a:pPr lvl="1"/>
+            <a:r>
+              <a:rPr lang="de-DE" dirty="0" smtClean="0"/>
+              <a:t>QR-Code</a:t>
+            </a:r>
+          </a:p>
+        </p:txBody>
+      </p:sp>
+      <p:pic>
+        <p:nvPicPr>
+          <p:cNvPr id="9" name="Content Placeholder 8"/>
+          <p:cNvPicPr>
+            <a:picLocks noGrp="1" noChangeAspect="1"/>
+          </p:cNvPicPr>
+          <p:nvPr>
+            <p:ph sz="half" idx="4294967295"/>
+          </p:nvPr>
+        </p:nvPicPr>
+        <p:blipFill>
+          <a:blip r:embed="rId2">
+            <a:extLst>
+              <a:ext uri="{28A0092B-C50C-407E-A947-70E740481C1C}">
+                <a14:useLocalDpi xmlns:a14="http://schemas.microsoft.com/office/drawing/2010/main" val="0"/>
+              </a:ext>
+            </a:extLst>
+          </a:blip>
+          <a:stretch>
+            <a:fillRect/>
+          </a:stretch>
+        </p:blipFill>
+        <p:spPr>
+          <a:xfrm>
+            <a:off x="7824790" y="4191000"/>
+            <a:ext cx="1828800" cy="1828800"/>
+          </a:xfrm>
+          <a:prstGeom prst="rect">
+            <a:avLst/>
+          </a:prstGeom>
+        </p:spPr>
+      </p:pic>
+      <p:pic>
+        <p:nvPicPr>
+          <p:cNvPr id="6" name="Picture 5"/>
+          <p:cNvPicPr>
+            <a:picLocks noChangeAspect="1"/>
+          </p:cNvPicPr>
+          <p:nvPr/>
+        </p:nvPicPr>
+        <p:blipFill>
+          <a:blip r:embed="rId3">
+            <a:extLst>
+              <a:ext uri="{28A0092B-C50C-407E-A947-70E740481C1C}">
+                <a14:useLocalDpi xmlns:a14="http://schemas.microsoft.com/office/drawing/2010/main" val="0"/>
+              </a:ext>
+            </a:extLst>
+          </a:blip>
+          <a:stretch>
+            <a:fillRect/>
+          </a:stretch>
+        </p:blipFill>
+        <p:spPr>
+          <a:xfrm>
+            <a:off x="1783965" y="4072169"/>
+            <a:ext cx="2188923" cy="2188923"/>
+          </a:xfrm>
+          <a:prstGeom prst="rect">
+            <a:avLst/>
+          </a:prstGeom>
+        </p:spPr>
+      </p:pic>
+      <p:pic>
+        <p:nvPicPr>
+          <p:cNvPr id="1026" name="Picture 2" descr="http://www.androidcentral.com/sites/androidcentral.com/files/styles/large/public/article_images/2014/04/NFC_Forum_N-Mark_RGB.jpg?itok=QzvRiGCb"/>
+          <p:cNvPicPr>
+            <a:picLocks noChangeAspect="1" noChangeArrowheads="1"/>
+          </p:cNvPicPr>
+          <p:nvPr/>
+        </p:nvPicPr>
+        <p:blipFill>
+          <a:blip r:embed="rId4" cstate="print">
+            <a:extLst>
+              <a:ext uri="{28A0092B-C50C-407E-A947-70E740481C1C}">
+                <a14:useLocalDpi xmlns:a14="http://schemas.microsoft.com/office/drawing/2010/main" val="0"/>
+              </a:ext>
+            </a:extLst>
+          </a:blip>
+          <a:srcRect/>
+          <a:stretch>
+            <a:fillRect/>
+          </a:stretch>
+        </p:blipFill>
+        <p:spPr bwMode="auto">
+          <a:xfrm>
+            <a:off x="4809743" y="4251788"/>
+            <a:ext cx="2178192" cy="1829681"/>
+          </a:xfrm>
+          <a:prstGeom prst="rect">
+            <a:avLst/>
+          </a:prstGeom>
+          <a:noFill/>
+          <a:extLst>
+            <a:ext uri="{909E8E84-426E-40DD-AFC4-6F175D3DCCD1}">
+              <a14:hiddenFill xmlns:a14="http://schemas.microsoft.com/office/drawing/2010/main">
+                <a:solidFill>
+                  <a:srgbClr val="FFFFFF"/>
+                </a:solidFill>
+              </a14:hiddenFill>
+            </a:ext>
+          </a:extLst>
+        </p:spPr>
+      </p:pic>
+    </p:spTree>
+    <p:extLst>
+      <p:ext uri="{BB962C8B-B14F-4D97-AF65-F5344CB8AC3E}">
+        <p14:creationId xmlns:p14="http://schemas.microsoft.com/office/powerpoint/2010/main" val="791101128"/>
+      </p:ext>
+    </p:extLst>
+  </p:cSld>
+  <p:clrMapOvr>
+    <a:masterClrMapping/>
+  </p:clrMapOvr>
+</p:sld>
+</file>
+
+<file path=ppt/slides/slide7.xml><?xml version="1.0" encoding="utf-8"?>
+<p:sld xmlns:a="http://schemas.openxmlformats.org/drawingml/2006/main" xmlns:r="http://schemas.openxmlformats.org/officeDocument/2006/relationships" xmlns:p="http://schemas.openxmlformats.org/presentationml/2006/main">
+  <p:cSld>
+    <p:spTree>
+      <p:nvGrpSpPr>
+        <p:cNvPr id="1" name=""/>
+        <p:cNvGrpSpPr/>
+        <p:nvPr/>
+      </p:nvGrpSpPr>
+      <p:grpSpPr>
+        <a:xfrm>
+          <a:off x="0" y="0"/>
+          <a:ext cx="0" cy="0"/>
+          <a:chOff x="0" y="0"/>
+          <a:chExt cx="0" cy="0"/>
+        </a:xfrm>
+      </p:grpSpPr>
+      <p:sp>
+        <p:nvSpPr>
+          <p:cNvPr id="2" name="Title 1"/>
+          <p:cNvSpPr>
+            <a:spLocks noGrp="1"/>
+          </p:cNvSpPr>
+          <p:nvPr>
+            <p:ph type="title"/>
+          </p:nvPr>
+        </p:nvSpPr>
+        <p:spPr/>
+        <p:txBody>
+          <a:bodyPr/>
+          <a:lstStyle/>
+          <a:p>
+            <a:r>
+              <a:rPr lang="de-DE" dirty="0" smtClean="0"/>
+              <a:t>Realisierung</a:t>
+            </a:r>
+            <a:endParaRPr lang="de-DE" dirty="0"/>
+          </a:p>
+        </p:txBody>
+      </p:sp>
+      <p:sp>
+        <p:nvSpPr>
+          <p:cNvPr id="3" name="Content Placeholder 2"/>
+          <p:cNvSpPr>
+            <a:spLocks noGrp="1"/>
+          </p:cNvSpPr>
+          <p:nvPr>
+            <p:ph sz="half" idx="1"/>
+          </p:nvPr>
+        </p:nvSpPr>
+        <p:spPr/>
+        <p:txBody>
+          <a:bodyPr/>
+          <a:lstStyle/>
+          <a:p>
+            <a:r>
+              <a:rPr lang="de-DE" dirty="0" smtClean="0"/>
+              <a:t>Startbildschirm – allgemeine Erklärung zur Funktionsweise der App</a:t>
+            </a:r>
+          </a:p>
+          <a:p>
+            <a:r>
+              <a:rPr lang="de-DE" dirty="0" smtClean="0"/>
+              <a:t>Steuerung der Datenbrillen</a:t>
+            </a:r>
+          </a:p>
+          <a:p>
+            <a:r>
+              <a:rPr lang="de-DE" dirty="0" smtClean="0"/>
+              <a:t>Bereich zur Anzeige der Informationen</a:t>
+            </a:r>
+          </a:p>
+          <a:p>
+            <a:endParaRPr lang="de-DE" dirty="0" smtClean="0"/>
+          </a:p>
+        </p:txBody>
+      </p:sp>
+      <p:pic>
+        <p:nvPicPr>
+          <p:cNvPr id="5" name="Grafik 11" descr="C:\Users\Alexander\AppData\Local\Microsoft\Windows\INetCache\Content.Word\Screenshot_2015-05-04-07-56-16.png"/>
+          <p:cNvPicPr>
+            <a:picLocks noGrp="1" noChangeAspect="1"/>
+          </p:cNvPicPr>
+          <p:nvPr>
+            <p:ph sz="half" idx="2"/>
+          </p:nvPr>
+        </p:nvPicPr>
+        <p:blipFill rotWithShape="1">
+          <a:blip r:embed="rId2" cstate="print">
+            <a:extLst>
+              <a:ext uri="{28A0092B-C50C-407E-A947-70E740481C1C}">
+                <a14:useLocalDpi xmlns:a14="http://schemas.microsoft.com/office/drawing/2010/main" val="0"/>
+              </a:ext>
+            </a:extLst>
+          </a:blip>
+          <a:srcRect t="4062"/>
+          <a:stretch/>
+        </p:blipFill>
+        <p:spPr bwMode="auto">
+          <a:xfrm>
+            <a:off x="7594555" y="2331650"/>
+            <a:ext cx="2321812" cy="3960000"/>
+          </a:xfrm>
+          <a:prstGeom prst="rect">
+            <a:avLst/>
+          </a:prstGeom>
+          <a:ln>
+            <a:noFill/>
+          </a:ln>
+          <a:effectLst>
+            <a:outerShdw blurRad="190500" algn="tl" rotWithShape="0">
+              <a:srgbClr val="000000">
+                <a:alpha val="70000"/>
+              </a:srgbClr>
+            </a:outerShdw>
+          </a:effectLst>
+          <a:extLst>
+            <a:ext uri="{53640926-AAD7-44D8-BBD7-CCE9431645EC}">
+              <a14:shadowObscured xmlns:a14="http://schemas.microsoft.com/office/drawing/2010/main"/>
+            </a:ext>
+          </a:extLst>
+        </p:spPr>
+      </p:pic>
+    </p:spTree>
+    <p:extLst>
+      <p:ext uri="{BB962C8B-B14F-4D97-AF65-F5344CB8AC3E}">
+        <p14:creationId xmlns:p14="http://schemas.microsoft.com/office/powerpoint/2010/main" val="2974787173"/>
+      </p:ext>
+    </p:extLst>
+  </p:cSld>
+  <p:clrMapOvr>
+    <a:masterClrMapping/>
+  </p:clrMapOvr>
+</p:sld>
+</file>
+
+<file path=ppt/slides/slide8.xml><?xml version="1.0" encoding="utf-8"?>
+<p:sld xmlns:a="http://schemas.openxmlformats.org/drawingml/2006/main" xmlns:r="http://schemas.openxmlformats.org/officeDocument/2006/relationships" xmlns:p="http://schemas.openxmlformats.org/presentationml/2006/main">
+  <p:cSld>
+    <p:spTree>
+      <p:nvGrpSpPr>
+        <p:cNvPr id="1" name=""/>
+        <p:cNvGrpSpPr/>
+        <p:nvPr/>
+      </p:nvGrpSpPr>
+      <p:grpSpPr>
+        <a:xfrm>
+          <a:off x="0" y="0"/>
+          <a:ext cx="0" cy="0"/>
+          <a:chOff x="0" y="0"/>
+          <a:chExt cx="0" cy="0"/>
+        </a:xfrm>
+      </p:grpSpPr>
+      <p:sp>
+        <p:nvSpPr>
+          <p:cNvPr id="2" name="Title 1"/>
+          <p:cNvSpPr>
+            <a:spLocks noGrp="1"/>
+          </p:cNvSpPr>
+          <p:nvPr>
+            <p:ph type="title"/>
+          </p:nvPr>
+        </p:nvSpPr>
+        <p:spPr/>
+        <p:txBody>
+          <a:bodyPr/>
+          <a:lstStyle/>
+          <a:p>
+            <a:r>
+              <a:rPr lang="de-DE" dirty="0" smtClean="0"/>
+              <a:t>Realisierung</a:t>
+            </a:r>
+            <a:endParaRPr lang="de-DE" dirty="0"/>
+          </a:p>
+        </p:txBody>
+      </p:sp>
+      <p:sp>
+        <p:nvSpPr>
+          <p:cNvPr id="3" name="Content Placeholder 2"/>
+          <p:cNvSpPr>
+            <a:spLocks noGrp="1"/>
+          </p:cNvSpPr>
+          <p:nvPr>
+            <p:ph sz="half" idx="1"/>
+          </p:nvPr>
+        </p:nvSpPr>
+        <p:spPr/>
+        <p:txBody>
+          <a:bodyPr/>
+          <a:lstStyle/>
+          <a:p>
+            <a:r>
+              <a:rPr lang="de-DE" dirty="0" smtClean="0"/>
+              <a:t>Das Menü beinhaltet sechs Menüpunkte:</a:t>
+            </a:r>
+          </a:p>
+          <a:p>
+            <a:pPr>
+              <a:buFont typeface="+mj-lt"/>
+              <a:buAutoNum type="arabicPeriod"/>
+            </a:pPr>
+            <a:r>
+              <a:rPr lang="de-DE" dirty="0" smtClean="0"/>
+              <a:t>Steuerung</a:t>
+            </a:r>
+          </a:p>
+          <a:p>
+            <a:pPr>
+              <a:buFont typeface="+mj-lt"/>
+              <a:buAutoNum type="arabicPeriod"/>
+            </a:pPr>
+            <a:r>
+              <a:rPr lang="de-DE" dirty="0" smtClean="0"/>
+              <a:t>Datenpakete</a:t>
+            </a:r>
+          </a:p>
+          <a:p>
+            <a:pPr>
+              <a:buFont typeface="+mj-lt"/>
+              <a:buAutoNum type="arabicPeriod"/>
+            </a:pPr>
+            <a:r>
+              <a:rPr lang="de-DE" dirty="0" smtClean="0"/>
+              <a:t>Datenpunkte</a:t>
+            </a:r>
+          </a:p>
+          <a:p>
+            <a:pPr>
+              <a:buFont typeface="+mj-lt"/>
+              <a:buAutoNum type="arabicPeriod"/>
+            </a:pPr>
+            <a:r>
+              <a:rPr lang="de-DE" dirty="0" smtClean="0"/>
+              <a:t>QR-Code</a:t>
+            </a:r>
+          </a:p>
+          <a:p>
+            <a:pPr>
+              <a:buFont typeface="+mj-lt"/>
+              <a:buAutoNum type="arabicPeriod"/>
+            </a:pPr>
+            <a:r>
+              <a:rPr lang="de-DE" dirty="0" smtClean="0"/>
+              <a:t>Einstellungen</a:t>
+            </a:r>
+          </a:p>
+          <a:p>
+            <a:pPr>
+              <a:buFont typeface="+mj-lt"/>
+              <a:buAutoNum type="arabicPeriod"/>
+            </a:pPr>
+            <a:r>
+              <a:rPr lang="de-DE" dirty="0" smtClean="0"/>
+              <a:t>Synchronisieren</a:t>
+            </a:r>
+            <a:endParaRPr lang="de-DE" dirty="0"/>
+          </a:p>
+        </p:txBody>
+      </p:sp>
+      <p:pic>
+        <p:nvPicPr>
+          <p:cNvPr id="5" name="Grafik 1" descr="C:\Users\Alexander\AppData\Local\Microsoft\Windows\INetCache\Content.Word\Screenshot_2015-05-04-07-31-00.png"/>
+          <p:cNvPicPr>
+            <a:picLocks noGrp="1" noChangeAspect="1"/>
+          </p:cNvPicPr>
+          <p:nvPr>
+            <p:ph sz="half" idx="2"/>
+          </p:nvPr>
+        </p:nvPicPr>
+        <p:blipFill rotWithShape="1">
+          <a:blip r:embed="rId2" cstate="print">
+            <a:extLst>
+              <a:ext uri="{28A0092B-C50C-407E-A947-70E740481C1C}">
+                <a14:useLocalDpi xmlns:a14="http://schemas.microsoft.com/office/drawing/2010/main" val="0"/>
+              </a:ext>
+            </a:extLst>
+          </a:blip>
+          <a:srcRect t="4233"/>
+          <a:stretch/>
+        </p:blipFill>
+        <p:spPr bwMode="auto">
+          <a:xfrm>
+            <a:off x="7590409" y="2331650"/>
+            <a:ext cx="2325958" cy="3960000"/>
+          </a:xfrm>
+          <a:prstGeom prst="rect">
+            <a:avLst/>
+          </a:prstGeom>
+          <a:ln>
+            <a:noFill/>
+          </a:ln>
+          <a:effectLst>
+            <a:outerShdw blurRad="190500" algn="tl" rotWithShape="0">
+              <a:srgbClr val="000000">
+                <a:alpha val="70000"/>
+              </a:srgbClr>
+            </a:outerShdw>
+          </a:effectLst>
+          <a:extLst>
+            <a:ext uri="{53640926-AAD7-44D8-BBD7-CCE9431645EC}">
+              <a14:shadowObscured xmlns:a14="http://schemas.microsoft.com/office/drawing/2010/main"/>
+            </a:ext>
+          </a:extLst>
+        </p:spPr>
+      </p:pic>
+    </p:spTree>
+    <p:extLst>
+      <p:ext uri="{BB962C8B-B14F-4D97-AF65-F5344CB8AC3E}">
+        <p14:creationId xmlns:p14="http://schemas.microsoft.com/office/powerpoint/2010/main" val="1819311950"/>
+      </p:ext>
+    </p:extLst>
+  </p:cSld>
+  <p:clrMapOvr>
+    <a:masterClrMapping/>
+  </p:clrMapOvr>
+</p:sld>
+</file>
+
+<file path=ppt/slides/slide9.xml><?xml version="1.0" encoding="utf-8"?>
+<p:sld xmlns:a="http://schemas.openxmlformats.org/drawingml/2006/main" xmlns:r="http://schemas.openxmlformats.org/officeDocument/2006/relationships" xmlns:p="http://schemas.openxmlformats.org/presentationml/2006/main">
+  <p:cSld>
+    <p:spTree>
+      <p:nvGrpSpPr>
+        <p:cNvPr id="1" name=""/>
+        <p:cNvGrpSpPr/>
+        <p:nvPr/>
+      </p:nvGrpSpPr>
+      <p:grpSpPr>
+        <a:xfrm>
+          <a:off x="0" y="0"/>
+          <a:ext cx="0" cy="0"/>
+          <a:chOff x="0" y="0"/>
+          <a:chExt cx="0" cy="0"/>
+        </a:xfrm>
+      </p:grpSpPr>
+      <p:sp>
+        <p:nvSpPr>
+          <p:cNvPr id="2" name="Title 1"/>
+          <p:cNvSpPr>
+            <a:spLocks noGrp="1"/>
+          </p:cNvSpPr>
+          <p:nvPr>
+            <p:ph type="title"/>
+          </p:nvPr>
+        </p:nvSpPr>
+        <p:spPr/>
+        <p:txBody>
+          <a:bodyPr/>
+          <a:lstStyle/>
+          <a:p>
+            <a:r>
+              <a:rPr lang="de-DE" dirty="0" smtClean="0"/>
+              <a:t>Realisierung</a:t>
+            </a:r>
+            <a:endParaRPr lang="de-DE" dirty="0"/>
+          </a:p>
+        </p:txBody>
+      </p:sp>
+      <p:sp>
+        <p:nvSpPr>
+          <p:cNvPr id="3" name="Content Placeholder 2"/>
+          <p:cNvSpPr>
+            <a:spLocks noGrp="1"/>
+          </p:cNvSpPr>
+          <p:nvPr>
+            <p:ph sz="half" idx="1"/>
+          </p:nvPr>
+        </p:nvSpPr>
+        <p:spPr/>
+        <p:txBody>
+          <a:bodyPr/>
+          <a:lstStyle/>
+          <a:p>
+            <a:r>
+              <a:rPr lang="de-DE" dirty="0" smtClean="0"/>
+              <a:t>Verwendung mehrerer Pakete gleichzeitig möglich</a:t>
+            </a:r>
+          </a:p>
+          <a:p>
+            <a:r>
+              <a:rPr lang="de-DE" dirty="0" smtClean="0"/>
+              <a:t>Unterstützung mehrerer Pakete von Stadt und Land Salzburg</a:t>
+            </a:r>
+          </a:p>
+          <a:p>
+            <a:r>
+              <a:rPr lang="de-DE" dirty="0" smtClean="0"/>
+              <a:t>Einfach über Suchfunktion erweiterbar</a:t>
+            </a:r>
+          </a:p>
+          <a:p>
+            <a:r>
+              <a:rPr lang="de-DE" dirty="0" smtClean="0"/>
+              <a:t>Dynamische Darstellung durch Änderung der Paketfarben und </a:t>
+            </a:r>
+            <a:r>
+              <a:rPr lang="de-DE" dirty="0" err="1" smtClean="0"/>
+              <a:t>Visibilität</a:t>
+            </a:r>
+            <a:endParaRPr lang="de-DE" dirty="0" smtClean="0"/>
+          </a:p>
+          <a:p>
+            <a:endParaRPr lang="de-DE" dirty="0" smtClean="0"/>
+          </a:p>
+        </p:txBody>
+      </p:sp>
+      <p:pic>
+        <p:nvPicPr>
+          <p:cNvPr id="7" name="Grafik 12" descr="C:\Users\Alexander\AppData\Local\Microsoft\Windows\INetCache\Content.Word\Screenshot_2015-05-04-07-38-29.png"/>
+          <p:cNvPicPr>
+            <a:picLocks noGrp="1" noChangeAspect="1"/>
+          </p:cNvPicPr>
+          <p:nvPr>
+            <p:ph sz="half" idx="2"/>
+          </p:nvPr>
+        </p:nvPicPr>
+        <p:blipFill rotWithShape="1">
+          <a:blip r:embed="rId2" cstate="print">
+            <a:extLst>
+              <a:ext uri="{28A0092B-C50C-407E-A947-70E740481C1C}">
+                <a14:useLocalDpi xmlns:a14="http://schemas.microsoft.com/office/drawing/2010/main" val="0"/>
+              </a:ext>
+            </a:extLst>
+          </a:blip>
+          <a:srcRect t="3958"/>
+          <a:stretch/>
+        </p:blipFill>
+        <p:spPr bwMode="auto">
+          <a:xfrm>
+            <a:off x="6573488" y="2331650"/>
+            <a:ext cx="2319297" cy="3960000"/>
+          </a:xfrm>
+          <a:prstGeom prst="rect">
+            <a:avLst/>
+          </a:prstGeom>
+          <a:ln>
+            <a:noFill/>
+          </a:ln>
+          <a:effectLst>
+            <a:outerShdw blurRad="190500" algn="tl" rotWithShape="0">
+              <a:srgbClr val="000000">
+                <a:alpha val="70000"/>
+              </a:srgbClr>
+            </a:outerShdw>
+          </a:effectLst>
+          <a:extLst>
+            <a:ext uri="{53640926-AAD7-44D8-BBD7-CCE9431645EC}">
+              <a14:shadowObscured xmlns:a14="http://schemas.microsoft.com/office/drawing/2010/main"/>
+            </a:ext>
+          </a:extLst>
+        </p:spPr>
+      </p:pic>
+      <p:pic>
+        <p:nvPicPr>
+          <p:cNvPr id="5" name="Grafik 16" descr="C:\Users\Alexander\AppData\Local\Microsoft\Windows\INetCache\Content.Word\Screenshot_2015-05-04-07-43-18.png"/>
+          <p:cNvPicPr>
+            <a:picLocks noChangeAspect="1"/>
+          </p:cNvPicPr>
+          <p:nvPr/>
+        </p:nvPicPr>
+        <p:blipFill rotWithShape="1">
+          <a:blip r:embed="rId3" cstate="print">
+            <a:extLst>
+              <a:ext uri="{28A0092B-C50C-407E-A947-70E740481C1C}">
+                <a14:useLocalDpi xmlns:a14="http://schemas.microsoft.com/office/drawing/2010/main" val="0"/>
+              </a:ext>
+            </a:extLst>
+          </a:blip>
+          <a:srcRect t="4062"/>
+          <a:stretch/>
+        </p:blipFill>
+        <p:spPr bwMode="auto">
+          <a:xfrm>
+            <a:off x="9366970" y="2331650"/>
+            <a:ext cx="2321933" cy="3960000"/>
+          </a:xfrm>
+          <a:prstGeom prst="rect">
+            <a:avLst/>
+          </a:prstGeom>
+          <a:ln>
+            <a:noFill/>
+          </a:ln>
+          <a:effectLst>
+            <a:outerShdw blurRad="190500" algn="tl" rotWithShape="0">
+              <a:srgbClr val="000000">
+                <a:alpha val="70000"/>
+              </a:srgbClr>
+            </a:outerShdw>
+          </a:effectLst>
+          <a:extLst>
+            <a:ext uri="{53640926-AAD7-44D8-BBD7-CCE9431645EC}">
+              <a14:shadowObscured xmlns:a14="http://schemas.microsoft.com/office/drawing/2010/main"/>
+            </a:ext>
+          </a:extLst>
+        </p:spPr>
+      </p:pic>
+    </p:spTree>
+    <p:extLst>
+      <p:ext uri="{BB962C8B-B14F-4D97-AF65-F5344CB8AC3E}">
+        <p14:creationId xmlns:p14="http://schemas.microsoft.com/office/powerpoint/2010/main" val="87718694"/>
       </p:ext>
     </p:extLst>
   </p:cSld>

</xml_diff>